<commit_message>
updated presentation and results for base case
</commit_message>
<xml_diff>
--- a/CE391F_project_presentation_alexander_dunn.pptx
+++ b/CE391F_project_presentation_alexander_dunn.pptx
@@ -5380,7 +5380,28 @@
           <a:bodyPr/>
           <a:lstStyle/>
           <a:p>
-            <a:endParaRPr lang="en-US" dirty="0"/>
+            <a:r>
+              <a:rPr lang="en-US" dirty="0"/>
+              <a:t>Advance detection</a:t>
+            </a:r>
+          </a:p>
+          <a:p>
+            <a:r>
+              <a:rPr lang="en-US" dirty="0"/>
+              <a:t>V2V and V2I</a:t>
+            </a:r>
+          </a:p>
+          <a:p>
+            <a:r>
+              <a:rPr lang="en-US" dirty="0"/>
+              <a:t>Will’s previous research</a:t>
+            </a:r>
+          </a:p>
+          <a:p>
+            <a:r>
+              <a:rPr lang="en-US" dirty="0"/>
+              <a:t>How effective is V2I advance detection at decreasing travel time through an intersection?</a:t>
+            </a:r>
           </a:p>
         </p:txBody>
       </p:sp>
@@ -5642,6 +5663,61 @@
               <a:t>3</a:t>
             </a:fld>
             <a:endParaRPr lang="en-US"/>
+          </a:p>
+        </p:txBody>
+      </p:sp>
+      <p:sp>
+        <p:nvSpPr>
+          <p:cNvPr id="11" name="TextBox 10">
+            <a:extLst>
+              <a:ext uri="{FF2B5EF4-FFF2-40B4-BE49-F238E27FC236}">
+                <a16:creationId xmlns:a16="http://schemas.microsoft.com/office/drawing/2014/main" id="{267A9BB4-E806-42C0-AE69-3DBCC8D6916A}"/>
+              </a:ext>
+            </a:extLst>
+          </p:cNvPr>
+          <p:cNvSpPr txBox="1"/>
+          <p:nvPr/>
+        </p:nvSpPr>
+        <p:spPr>
+          <a:xfrm>
+            <a:off x="7238199" y="3917482"/>
+            <a:ext cx="3821229" cy="2031325"/>
+          </a:xfrm>
+          <a:prstGeom prst="rect">
+            <a:avLst/>
+          </a:prstGeom>
+          <a:noFill/>
+          <a:ln>
+            <a:solidFill>
+              <a:schemeClr val="tx1"/>
+            </a:solidFill>
+          </a:ln>
+        </p:spPr>
+        <p:txBody>
+          <a:bodyPr wrap="square" rtlCol="0">
+            <a:spAutoFit/>
+          </a:bodyPr>
+          <a:lstStyle/>
+          <a:p>
+            <a:r>
+              <a:rPr lang="en-US" dirty="0"/>
+              <a:t>Place holder for diagram of intersection</a:t>
+            </a:r>
+          </a:p>
+          <a:p>
+            <a:endParaRPr lang="en-US" dirty="0"/>
+          </a:p>
+          <a:p>
+            <a:endParaRPr lang="en-US" dirty="0"/>
+          </a:p>
+          <a:p>
+            <a:endParaRPr lang="en-US" dirty="0"/>
+          </a:p>
+          <a:p>
+            <a:endParaRPr lang="en-US" dirty="0"/>
+          </a:p>
+          <a:p>
+            <a:endParaRPr lang="en-US" dirty="0"/>
           </a:p>
         </p:txBody>
       </p:sp>
@@ -10432,9 +10508,16 @@
             <p:ph idx="1"/>
           </p:nvPr>
         </p:nvSpPr>
-        <p:spPr/>
+        <p:spPr>
+          <a:xfrm>
+            <a:off x="838200" y="1825624"/>
+            <a:ext cx="10515600" cy="4530727"/>
+          </a:xfrm>
+        </p:spPr>
         <p:txBody>
-          <a:bodyPr/>
+          <a:bodyPr>
+            <a:normAutofit lnSpcReduction="10000"/>
+          </a:bodyPr>
           <a:lstStyle/>
           <a:p>
             <a:endParaRPr lang="en-US" dirty="0"/>
@@ -10450,6 +10533,18 @@
           </a:p>
           <a:p>
             <a:endParaRPr lang="en-US" dirty="0"/>
+          </a:p>
+          <a:p>
+            <a:endParaRPr lang="en-US" dirty="0"/>
+          </a:p>
+          <a:p>
+            <a:endParaRPr lang="en-US" dirty="0"/>
+          </a:p>
+          <a:p>
+            <a:r>
+              <a:rPr lang="en-US" dirty="0"/>
+              <a:t>^Without V2I advance detection (base case)</a:t>
+            </a:r>
           </a:p>
           <a:p>
             <a:r>
@@ -10717,6 +10812,592 @@
               <a:t>8</a:t>
             </a:fld>
             <a:endParaRPr lang="en-US"/>
+          </a:p>
+        </p:txBody>
+      </p:sp>
+      <p:grpSp>
+        <p:nvGrpSpPr>
+          <p:cNvPr id="25" name="Group 24">
+            <a:extLst>
+              <a:ext uri="{FF2B5EF4-FFF2-40B4-BE49-F238E27FC236}">
+                <a16:creationId xmlns:a16="http://schemas.microsoft.com/office/drawing/2014/main" id="{794D5508-50E3-4D8A-8F9B-70A7556CA6F4}"/>
+              </a:ext>
+            </a:extLst>
+          </p:cNvPr>
+          <p:cNvGrpSpPr/>
+          <p:nvPr/>
+        </p:nvGrpSpPr>
+        <p:grpSpPr>
+          <a:xfrm>
+            <a:off x="2728982" y="627654"/>
+            <a:ext cx="6734036" cy="3890530"/>
+            <a:chOff x="2832710" y="366285"/>
+            <a:chExt cx="6734036" cy="3890530"/>
+          </a:xfrm>
+        </p:grpSpPr>
+        <p:pic>
+          <p:nvPicPr>
+            <p:cNvPr id="13" name="Picture 12">
+              <a:extLst>
+                <a:ext uri="{FF2B5EF4-FFF2-40B4-BE49-F238E27FC236}">
+                  <a16:creationId xmlns:a16="http://schemas.microsoft.com/office/drawing/2014/main" id="{57D85744-BD00-48DF-9A37-DAD7B68A58EA}"/>
+                </a:ext>
+              </a:extLst>
+            </p:cNvPr>
+            <p:cNvPicPr>
+              <a:picLocks noChangeAspect="1"/>
+            </p:cNvPicPr>
+            <p:nvPr/>
+          </p:nvPicPr>
+          <p:blipFill>
+            <a:blip r:embed="rId3"/>
+            <a:stretch>
+              <a:fillRect/>
+            </a:stretch>
+          </p:blipFill>
+          <p:spPr>
+            <a:xfrm>
+              <a:off x="2832710" y="366285"/>
+              <a:ext cx="6734036" cy="3767419"/>
+            </a:xfrm>
+            <a:prstGeom prst="rect">
+              <a:avLst/>
+            </a:prstGeom>
+          </p:spPr>
+        </p:pic>
+        <p:sp>
+          <p:nvSpPr>
+            <p:cNvPr id="15" name="TextBox 14">
+              <a:extLst>
+                <a:ext uri="{FF2B5EF4-FFF2-40B4-BE49-F238E27FC236}">
+                  <a16:creationId xmlns:a16="http://schemas.microsoft.com/office/drawing/2014/main" id="{09DC6097-0E0D-4645-B0BE-F2C5014D5793}"/>
+                </a:ext>
+              </a:extLst>
+            </p:cNvPr>
+            <p:cNvSpPr txBox="1"/>
+            <p:nvPr/>
+          </p:nvSpPr>
+          <p:spPr>
+            <a:xfrm>
+              <a:off x="3328149" y="3949038"/>
+              <a:ext cx="458780" cy="307777"/>
+            </a:xfrm>
+            <a:prstGeom prst="rect">
+              <a:avLst/>
+            </a:prstGeom>
+            <a:noFill/>
+          </p:spPr>
+          <p:txBody>
+            <a:bodyPr wrap="none" rtlCol="0">
+              <a:spAutoFit/>
+            </a:bodyPr>
+            <a:lstStyle/>
+            <a:p>
+              <a:r>
+                <a:rPr lang="en-US" sz="1400" dirty="0">
+                  <a:solidFill>
+                    <a:schemeClr val="tx1">
+                      <a:lumMod val="65000"/>
+                      <a:lumOff val="35000"/>
+                    </a:schemeClr>
+                  </a:solidFill>
+                </a:rPr>
+                <a:t>180</a:t>
+              </a:r>
+              <a:endParaRPr lang="en-US" dirty="0">
+                <a:solidFill>
+                  <a:schemeClr val="tx1">
+                    <a:lumMod val="65000"/>
+                    <a:lumOff val="35000"/>
+                  </a:schemeClr>
+                </a:solidFill>
+              </a:endParaRPr>
+            </a:p>
+          </p:txBody>
+        </p:sp>
+        <p:sp>
+          <p:nvSpPr>
+            <p:cNvPr id="16" name="TextBox 15">
+              <a:extLst>
+                <a:ext uri="{FF2B5EF4-FFF2-40B4-BE49-F238E27FC236}">
+                  <a16:creationId xmlns:a16="http://schemas.microsoft.com/office/drawing/2014/main" id="{885595D4-BBE0-4543-BB8F-2D8BB338937C}"/>
+                </a:ext>
+              </a:extLst>
+            </p:cNvPr>
+            <p:cNvSpPr txBox="1"/>
+            <p:nvPr/>
+          </p:nvSpPr>
+          <p:spPr>
+            <a:xfrm>
+              <a:off x="3967239" y="3949038"/>
+              <a:ext cx="458780" cy="307777"/>
+            </a:xfrm>
+            <a:prstGeom prst="rect">
+              <a:avLst/>
+            </a:prstGeom>
+            <a:noFill/>
+          </p:spPr>
+          <p:txBody>
+            <a:bodyPr wrap="none" rtlCol="0">
+              <a:spAutoFit/>
+            </a:bodyPr>
+            <a:lstStyle/>
+            <a:p>
+              <a:r>
+                <a:rPr lang="en-US" sz="1400" dirty="0">
+                  <a:solidFill>
+                    <a:schemeClr val="tx1">
+                      <a:lumMod val="65000"/>
+                      <a:lumOff val="35000"/>
+                    </a:schemeClr>
+                  </a:solidFill>
+                </a:rPr>
+                <a:t>249</a:t>
+              </a:r>
+              <a:endParaRPr lang="en-US" dirty="0">
+                <a:solidFill>
+                  <a:schemeClr val="tx1">
+                    <a:lumMod val="65000"/>
+                    <a:lumOff val="35000"/>
+                  </a:schemeClr>
+                </a:solidFill>
+              </a:endParaRPr>
+            </a:p>
+          </p:txBody>
+        </p:sp>
+        <p:sp>
+          <p:nvSpPr>
+            <p:cNvPr id="17" name="TextBox 16">
+              <a:extLst>
+                <a:ext uri="{FF2B5EF4-FFF2-40B4-BE49-F238E27FC236}">
+                  <a16:creationId xmlns:a16="http://schemas.microsoft.com/office/drawing/2014/main" id="{320B7683-003E-4BF5-A9E1-B016BDE26FA9}"/>
+                </a:ext>
+              </a:extLst>
+            </p:cNvPr>
+            <p:cNvSpPr txBox="1"/>
+            <p:nvPr/>
+          </p:nvSpPr>
+          <p:spPr>
+            <a:xfrm>
+              <a:off x="4606329" y="3949038"/>
+              <a:ext cx="458780" cy="307777"/>
+            </a:xfrm>
+            <a:prstGeom prst="rect">
+              <a:avLst/>
+            </a:prstGeom>
+            <a:noFill/>
+          </p:spPr>
+          <p:txBody>
+            <a:bodyPr wrap="none" rtlCol="0">
+              <a:spAutoFit/>
+            </a:bodyPr>
+            <a:lstStyle/>
+            <a:p>
+              <a:r>
+                <a:rPr lang="en-US" sz="1400" dirty="0">
+                  <a:solidFill>
+                    <a:schemeClr val="tx1">
+                      <a:lumMod val="65000"/>
+                      <a:lumOff val="35000"/>
+                    </a:schemeClr>
+                  </a:solidFill>
+                </a:rPr>
+                <a:t>318</a:t>
+              </a:r>
+              <a:endParaRPr lang="en-US" dirty="0">
+                <a:solidFill>
+                  <a:schemeClr val="tx1">
+                    <a:lumMod val="65000"/>
+                    <a:lumOff val="35000"/>
+                  </a:schemeClr>
+                </a:solidFill>
+              </a:endParaRPr>
+            </a:p>
+          </p:txBody>
+        </p:sp>
+        <p:sp>
+          <p:nvSpPr>
+            <p:cNvPr id="18" name="TextBox 17">
+              <a:extLst>
+                <a:ext uri="{FF2B5EF4-FFF2-40B4-BE49-F238E27FC236}">
+                  <a16:creationId xmlns:a16="http://schemas.microsoft.com/office/drawing/2014/main" id="{1C45340D-921B-4FEF-9F00-B327FC792E6A}"/>
+                </a:ext>
+              </a:extLst>
+            </p:cNvPr>
+            <p:cNvSpPr txBox="1"/>
+            <p:nvPr/>
+          </p:nvSpPr>
+          <p:spPr>
+            <a:xfrm>
+              <a:off x="5245419" y="3949038"/>
+              <a:ext cx="458780" cy="307777"/>
+            </a:xfrm>
+            <a:prstGeom prst="rect">
+              <a:avLst/>
+            </a:prstGeom>
+            <a:noFill/>
+          </p:spPr>
+          <p:txBody>
+            <a:bodyPr wrap="none" rtlCol="0">
+              <a:spAutoFit/>
+            </a:bodyPr>
+            <a:lstStyle/>
+            <a:p>
+              <a:r>
+                <a:rPr lang="en-US" sz="1400" dirty="0">
+                  <a:solidFill>
+                    <a:schemeClr val="tx1">
+                      <a:lumMod val="65000"/>
+                      <a:lumOff val="35000"/>
+                    </a:schemeClr>
+                  </a:solidFill>
+                </a:rPr>
+                <a:t>387</a:t>
+              </a:r>
+              <a:endParaRPr lang="en-US" dirty="0">
+                <a:solidFill>
+                  <a:schemeClr val="tx1">
+                    <a:lumMod val="65000"/>
+                    <a:lumOff val="35000"/>
+                  </a:schemeClr>
+                </a:solidFill>
+              </a:endParaRPr>
+            </a:p>
+          </p:txBody>
+        </p:sp>
+        <p:sp>
+          <p:nvSpPr>
+            <p:cNvPr id="19" name="TextBox 18">
+              <a:extLst>
+                <a:ext uri="{FF2B5EF4-FFF2-40B4-BE49-F238E27FC236}">
+                  <a16:creationId xmlns:a16="http://schemas.microsoft.com/office/drawing/2014/main" id="{74FDA698-14B7-4D00-AA5C-6D062927E376}"/>
+                </a:ext>
+              </a:extLst>
+            </p:cNvPr>
+            <p:cNvSpPr txBox="1"/>
+            <p:nvPr/>
+          </p:nvSpPr>
+          <p:spPr>
+            <a:xfrm>
+              <a:off x="5884509" y="3949038"/>
+              <a:ext cx="458780" cy="307777"/>
+            </a:xfrm>
+            <a:prstGeom prst="rect">
+              <a:avLst/>
+            </a:prstGeom>
+            <a:noFill/>
+          </p:spPr>
+          <p:txBody>
+            <a:bodyPr wrap="none" rtlCol="0">
+              <a:spAutoFit/>
+            </a:bodyPr>
+            <a:lstStyle/>
+            <a:p>
+              <a:r>
+                <a:rPr lang="en-US" sz="1400" dirty="0">
+                  <a:solidFill>
+                    <a:schemeClr val="tx1">
+                      <a:lumMod val="65000"/>
+                      <a:lumOff val="35000"/>
+                    </a:schemeClr>
+                  </a:solidFill>
+                </a:rPr>
+                <a:t>456</a:t>
+              </a:r>
+              <a:endParaRPr lang="en-US" dirty="0">
+                <a:solidFill>
+                  <a:schemeClr val="tx1">
+                    <a:lumMod val="65000"/>
+                    <a:lumOff val="35000"/>
+                  </a:schemeClr>
+                </a:solidFill>
+              </a:endParaRPr>
+            </a:p>
+          </p:txBody>
+        </p:sp>
+        <p:sp>
+          <p:nvSpPr>
+            <p:cNvPr id="20" name="TextBox 19">
+              <a:extLst>
+                <a:ext uri="{FF2B5EF4-FFF2-40B4-BE49-F238E27FC236}">
+                  <a16:creationId xmlns:a16="http://schemas.microsoft.com/office/drawing/2014/main" id="{C146EBB8-03AB-45B7-837F-2C8AA04550E0}"/>
+                </a:ext>
+              </a:extLst>
+            </p:cNvPr>
+            <p:cNvSpPr txBox="1"/>
+            <p:nvPr/>
+          </p:nvSpPr>
+          <p:spPr>
+            <a:xfrm>
+              <a:off x="6523599" y="3949038"/>
+              <a:ext cx="458780" cy="307777"/>
+            </a:xfrm>
+            <a:prstGeom prst="rect">
+              <a:avLst/>
+            </a:prstGeom>
+            <a:noFill/>
+          </p:spPr>
+          <p:txBody>
+            <a:bodyPr wrap="none" rtlCol="0">
+              <a:spAutoFit/>
+            </a:bodyPr>
+            <a:lstStyle/>
+            <a:p>
+              <a:r>
+                <a:rPr lang="en-US" sz="1400" dirty="0">
+                  <a:solidFill>
+                    <a:schemeClr val="tx1">
+                      <a:lumMod val="65000"/>
+                      <a:lumOff val="35000"/>
+                    </a:schemeClr>
+                  </a:solidFill>
+                </a:rPr>
+                <a:t>525</a:t>
+              </a:r>
+              <a:endParaRPr lang="en-US" dirty="0">
+                <a:solidFill>
+                  <a:schemeClr val="tx1">
+                    <a:lumMod val="65000"/>
+                    <a:lumOff val="35000"/>
+                  </a:schemeClr>
+                </a:solidFill>
+              </a:endParaRPr>
+            </a:p>
+          </p:txBody>
+        </p:sp>
+        <p:sp>
+          <p:nvSpPr>
+            <p:cNvPr id="21" name="TextBox 20">
+              <a:extLst>
+                <a:ext uri="{FF2B5EF4-FFF2-40B4-BE49-F238E27FC236}">
+                  <a16:creationId xmlns:a16="http://schemas.microsoft.com/office/drawing/2014/main" id="{585A096F-A108-46D4-8919-86E901BF142A}"/>
+                </a:ext>
+              </a:extLst>
+            </p:cNvPr>
+            <p:cNvSpPr txBox="1"/>
+            <p:nvPr/>
+          </p:nvSpPr>
+          <p:spPr>
+            <a:xfrm>
+              <a:off x="7162689" y="3949038"/>
+              <a:ext cx="458780" cy="307777"/>
+            </a:xfrm>
+            <a:prstGeom prst="rect">
+              <a:avLst/>
+            </a:prstGeom>
+            <a:noFill/>
+          </p:spPr>
+          <p:txBody>
+            <a:bodyPr wrap="none" rtlCol="0">
+              <a:spAutoFit/>
+            </a:bodyPr>
+            <a:lstStyle/>
+            <a:p>
+              <a:r>
+                <a:rPr lang="en-US" sz="1400" dirty="0">
+                  <a:solidFill>
+                    <a:schemeClr val="tx1">
+                      <a:lumMod val="65000"/>
+                      <a:lumOff val="35000"/>
+                    </a:schemeClr>
+                  </a:solidFill>
+                </a:rPr>
+                <a:t>594</a:t>
+              </a:r>
+              <a:endParaRPr lang="en-US" dirty="0">
+                <a:solidFill>
+                  <a:schemeClr val="tx1">
+                    <a:lumMod val="65000"/>
+                    <a:lumOff val="35000"/>
+                  </a:schemeClr>
+                </a:solidFill>
+              </a:endParaRPr>
+            </a:p>
+          </p:txBody>
+        </p:sp>
+        <p:sp>
+          <p:nvSpPr>
+            <p:cNvPr id="22" name="TextBox 21">
+              <a:extLst>
+                <a:ext uri="{FF2B5EF4-FFF2-40B4-BE49-F238E27FC236}">
+                  <a16:creationId xmlns:a16="http://schemas.microsoft.com/office/drawing/2014/main" id="{9FE040E5-AA0F-430A-A15B-7F2E6D1CB7B8}"/>
+                </a:ext>
+              </a:extLst>
+            </p:cNvPr>
+            <p:cNvSpPr txBox="1"/>
+            <p:nvPr/>
+          </p:nvSpPr>
+          <p:spPr>
+            <a:xfrm>
+              <a:off x="7801779" y="3949038"/>
+              <a:ext cx="458780" cy="307777"/>
+            </a:xfrm>
+            <a:prstGeom prst="rect">
+              <a:avLst/>
+            </a:prstGeom>
+            <a:noFill/>
+          </p:spPr>
+          <p:txBody>
+            <a:bodyPr wrap="none" rtlCol="0">
+              <a:spAutoFit/>
+            </a:bodyPr>
+            <a:lstStyle/>
+            <a:p>
+              <a:r>
+                <a:rPr lang="en-US" sz="1400" dirty="0">
+                  <a:solidFill>
+                    <a:schemeClr val="tx1">
+                      <a:lumMod val="65000"/>
+                      <a:lumOff val="35000"/>
+                    </a:schemeClr>
+                  </a:solidFill>
+                </a:rPr>
+                <a:t>663</a:t>
+              </a:r>
+              <a:endParaRPr lang="en-US" dirty="0">
+                <a:solidFill>
+                  <a:schemeClr val="tx1">
+                    <a:lumMod val="65000"/>
+                    <a:lumOff val="35000"/>
+                  </a:schemeClr>
+                </a:solidFill>
+              </a:endParaRPr>
+            </a:p>
+          </p:txBody>
+        </p:sp>
+        <p:sp>
+          <p:nvSpPr>
+            <p:cNvPr id="23" name="TextBox 22">
+              <a:extLst>
+                <a:ext uri="{FF2B5EF4-FFF2-40B4-BE49-F238E27FC236}">
+                  <a16:creationId xmlns:a16="http://schemas.microsoft.com/office/drawing/2014/main" id="{AF14AE3C-DA16-41EE-B3B9-FB197A7266E6}"/>
+                </a:ext>
+              </a:extLst>
+            </p:cNvPr>
+            <p:cNvSpPr txBox="1"/>
+            <p:nvPr/>
+          </p:nvSpPr>
+          <p:spPr>
+            <a:xfrm>
+              <a:off x="8440869" y="3949038"/>
+              <a:ext cx="458780" cy="307777"/>
+            </a:xfrm>
+            <a:prstGeom prst="rect">
+              <a:avLst/>
+            </a:prstGeom>
+            <a:noFill/>
+          </p:spPr>
+          <p:txBody>
+            <a:bodyPr wrap="none" rtlCol="0">
+              <a:spAutoFit/>
+            </a:bodyPr>
+            <a:lstStyle/>
+            <a:p>
+              <a:r>
+                <a:rPr lang="en-US" sz="1400" dirty="0">
+                  <a:solidFill>
+                    <a:schemeClr val="tx1">
+                      <a:lumMod val="65000"/>
+                      <a:lumOff val="35000"/>
+                    </a:schemeClr>
+                  </a:solidFill>
+                </a:rPr>
+                <a:t>732</a:t>
+              </a:r>
+              <a:endParaRPr lang="en-US" dirty="0">
+                <a:solidFill>
+                  <a:schemeClr val="tx1">
+                    <a:lumMod val="65000"/>
+                    <a:lumOff val="35000"/>
+                  </a:schemeClr>
+                </a:solidFill>
+              </a:endParaRPr>
+            </a:p>
+          </p:txBody>
+        </p:sp>
+        <p:sp>
+          <p:nvSpPr>
+            <p:cNvPr id="24" name="TextBox 23">
+              <a:extLst>
+                <a:ext uri="{FF2B5EF4-FFF2-40B4-BE49-F238E27FC236}">
+                  <a16:creationId xmlns:a16="http://schemas.microsoft.com/office/drawing/2014/main" id="{4DC669F2-573C-410A-B81E-6427B669AAAD}"/>
+                </a:ext>
+              </a:extLst>
+            </p:cNvPr>
+            <p:cNvSpPr txBox="1"/>
+            <p:nvPr/>
+          </p:nvSpPr>
+          <p:spPr>
+            <a:xfrm>
+              <a:off x="9079955" y="3949038"/>
+              <a:ext cx="458780" cy="307777"/>
+            </a:xfrm>
+            <a:prstGeom prst="rect">
+              <a:avLst/>
+            </a:prstGeom>
+            <a:noFill/>
+          </p:spPr>
+          <p:txBody>
+            <a:bodyPr wrap="none" rtlCol="0">
+              <a:spAutoFit/>
+            </a:bodyPr>
+            <a:lstStyle/>
+            <a:p>
+              <a:r>
+                <a:rPr lang="en-US" sz="1400" dirty="0">
+                  <a:solidFill>
+                    <a:schemeClr val="tx1">
+                      <a:lumMod val="65000"/>
+                      <a:lumOff val="35000"/>
+                    </a:schemeClr>
+                  </a:solidFill>
+                </a:rPr>
+                <a:t>801</a:t>
+              </a:r>
+              <a:endParaRPr lang="en-US" dirty="0">
+                <a:solidFill>
+                  <a:schemeClr val="tx1">
+                    <a:lumMod val="65000"/>
+                    <a:lumOff val="35000"/>
+                  </a:schemeClr>
+                </a:solidFill>
+              </a:endParaRPr>
+            </a:p>
+          </p:txBody>
+        </p:sp>
+      </p:grpSp>
+      <p:sp>
+        <p:nvSpPr>
+          <p:cNvPr id="26" name="TextBox 25">
+            <a:extLst>
+              <a:ext uri="{FF2B5EF4-FFF2-40B4-BE49-F238E27FC236}">
+                <a16:creationId xmlns:a16="http://schemas.microsoft.com/office/drawing/2014/main" id="{0BE53286-2285-4176-9B52-6D5D4794EBBA}"/>
+              </a:ext>
+            </a:extLst>
+          </p:cNvPr>
+          <p:cNvSpPr txBox="1"/>
+          <p:nvPr/>
+        </p:nvSpPr>
+        <p:spPr>
+          <a:xfrm>
+            <a:off x="5650092" y="4468452"/>
+            <a:ext cx="1536511" cy="369332"/>
+          </a:xfrm>
+          <a:prstGeom prst="rect">
+            <a:avLst/>
+          </a:prstGeom>
+          <a:noFill/>
+        </p:spPr>
+        <p:txBody>
+          <a:bodyPr wrap="none" rtlCol="0">
+            <a:spAutoFit/>
+          </a:bodyPr>
+          <a:lstStyle/>
+          <a:p>
+            <a:r>
+              <a:rPr lang="en-US" dirty="0"/>
+              <a:t>Travel Time (s)</a:t>
+            </a:r>
           </a:p>
         </p:txBody>
       </p:sp>

</xml_diff>

<commit_message>
updated presentation and results
</commit_message>
<xml_diff>
--- a/CE391F_project_presentation_alexander_dunn.pptx
+++ b/CE391F_project_presentation_alexander_dunn.pptx
@@ -125,6 +125,10 @@
 </p:presentation>
 </file>
 
+<file path=ppt/revisionInfo.xml><?xml version="1.0" encoding="utf-8"?>
+<p1510:revInfo xmlns:a="http://schemas.openxmlformats.org/drawingml/2006/main" xmlns:r="http://schemas.openxmlformats.org/officeDocument/2006/relationships" xmlns:p1510="http://schemas.microsoft.com/office/powerpoint/2015/10/main"/>
+</file>
+
 <file path=ppt/notesMasters/notesMaster1.xml><?xml version="1.0" encoding="utf-8"?>
 <p:notesMaster xmlns:a="http://schemas.openxmlformats.org/drawingml/2006/main" xmlns:r="http://schemas.openxmlformats.org/officeDocument/2006/relationships" xmlns:p="http://schemas.openxmlformats.org/presentationml/2006/main">
   <p:cSld>
@@ -207,7 +211,7 @@
           <a:p>
             <a:fld id="{24FA3959-E200-4F92-9F0F-E1E2FBCFA4D1}" type="datetimeFigureOut">
               <a:rPr lang="en-US" smtClean="0"/>
-              <a:t>12/08/17</a:t>
+              <a:t>12/09/17</a:t>
             </a:fld>
             <a:endParaRPr lang="en-US"/>
           </a:p>
@@ -621,7 +625,7 @@
           <a:p>
             <a:fld id="{09E31BD6-71F0-48CB-8F12-2BA491399544}" type="datetime1">
               <a:rPr lang="en-US" smtClean="0"/>
-              <a:t>12/08/17</a:t>
+              <a:t>12/09/17</a:t>
             </a:fld>
             <a:endParaRPr lang="en-US"/>
           </a:p>
@@ -822,7 +826,7 @@
           <a:p>
             <a:fld id="{FE3990BE-4D26-46D4-AB3A-585E3314093C}" type="datetime1">
               <a:rPr lang="en-US" smtClean="0"/>
-              <a:t>12/08/17</a:t>
+              <a:t>12/09/17</a:t>
             </a:fld>
             <a:endParaRPr lang="en-US"/>
           </a:p>
@@ -1033,7 +1037,7 @@
           <a:p>
             <a:fld id="{5B17F194-40A6-451F-B3E0-38F0DF096B51}" type="datetime1">
               <a:rPr lang="en-US" smtClean="0"/>
-              <a:t>12/08/17</a:t>
+              <a:t>12/09/17</a:t>
             </a:fld>
             <a:endParaRPr lang="en-US"/>
           </a:p>
@@ -1234,7 +1238,7 @@
           <a:p>
             <a:fld id="{DE8E9C18-AC3A-46D0-9E36-53F6B20717C9}" type="datetime1">
               <a:rPr lang="en-US" smtClean="0"/>
-              <a:t>12/08/17</a:t>
+              <a:t>12/09/17</a:t>
             </a:fld>
             <a:endParaRPr lang="en-US"/>
           </a:p>
@@ -1512,7 +1516,7 @@
           <a:p>
             <a:fld id="{F744186A-A145-43BF-A11E-AF48DE2EDF33}" type="datetime1">
               <a:rPr lang="en-US" smtClean="0"/>
-              <a:t>12/08/17</a:t>
+              <a:t>12/09/17</a:t>
             </a:fld>
             <a:endParaRPr lang="en-US"/>
           </a:p>
@@ -1780,7 +1784,7 @@
           <a:p>
             <a:fld id="{0E6F083F-E7F6-4A03-84C5-35F31DB791FE}" type="datetime1">
               <a:rPr lang="en-US" smtClean="0"/>
-              <a:t>12/08/17</a:t>
+              <a:t>12/09/17</a:t>
             </a:fld>
             <a:endParaRPr lang="en-US"/>
           </a:p>
@@ -2195,7 +2199,7 @@
           <a:p>
             <a:fld id="{0D577BDD-941A-403B-9A3D-51F413E612D2}" type="datetime1">
               <a:rPr lang="en-US" smtClean="0"/>
-              <a:t>12/08/17</a:t>
+              <a:t>12/09/17</a:t>
             </a:fld>
             <a:endParaRPr lang="en-US"/>
           </a:p>
@@ -2339,7 +2343,7 @@
           <a:p>
             <a:fld id="{55F1DDD3-E38E-4709-B0D9-FCCE2E9705A6}" type="datetime1">
               <a:rPr lang="en-US" smtClean="0"/>
-              <a:t>12/08/17</a:t>
+              <a:t>12/09/17</a:t>
             </a:fld>
             <a:endParaRPr lang="en-US"/>
           </a:p>
@@ -2455,7 +2459,7 @@
           <a:p>
             <a:fld id="{0956F791-754E-44D5-B411-67162EBD8EDC}" type="datetime1">
               <a:rPr lang="en-US" smtClean="0"/>
-              <a:t>12/08/17</a:t>
+              <a:t>12/09/17</a:t>
             </a:fld>
             <a:endParaRPr lang="en-US"/>
           </a:p>
@@ -2769,7 +2773,7 @@
           <a:p>
             <a:fld id="{F1717065-FA0D-4EB9-B677-C0587B698345}" type="datetime1">
               <a:rPr lang="en-US" smtClean="0"/>
-              <a:t>12/08/17</a:t>
+              <a:t>12/09/17</a:t>
             </a:fld>
             <a:endParaRPr lang="en-US"/>
           </a:p>
@@ -3060,7 +3064,7 @@
           <a:p>
             <a:fld id="{0CF8814B-722C-488D-9F14-A31035130475}" type="datetime1">
               <a:rPr lang="en-US" smtClean="0"/>
-              <a:t>12/08/17</a:t>
+              <a:t>12/09/17</a:t>
             </a:fld>
             <a:endParaRPr lang="en-US"/>
           </a:p>
@@ -3304,7 +3308,7 @@
           <a:p>
             <a:fld id="{FD7E8687-828C-4E2F-B060-BA6F96F203DB}" type="datetime1">
               <a:rPr lang="en-US" smtClean="0"/>
-              <a:t>12/08/17</a:t>
+              <a:t>12/09/17</a:t>
             </a:fld>
             <a:endParaRPr lang="en-US"/>
           </a:p>
@@ -3755,7 +3759,7 @@
           <a:p>
             <a:r>
               <a:rPr lang="en-US" sz="4400" b="1" dirty="0"/>
-              <a:t>Simulation of Advance Vehicle Detection Using V2I Communication and Gipps’ Car-Following Model</a:t>
+              <a:t>Simulation of V2I-Based Advance Detection Using Gipps’ Car-Following Model</a:t>
             </a:r>
             <a:endParaRPr lang="en-US" sz="4400" b="1" dirty="0">
               <a:latin typeface="+mn-lt"/>
@@ -4861,7 +4865,7 @@
           <a:p>
             <a:fld id="{45055422-CF85-4F00-9AA1-6B0462132045}" type="datetime1">
               <a:rPr lang="en-US" smtClean="0"/>
-              <a:t>12/08/17</a:t>
+              <a:t>12/09/17</a:t>
             </a:fld>
             <a:endParaRPr lang="en-US" dirty="0"/>
           </a:p>
@@ -5238,7 +5242,7 @@
           <a:p>
             <a:fld id="{ACB4D66B-B249-4FFD-A1BE-9D1F03DF6E29}" type="datetime1">
               <a:rPr lang="en-US" smtClean="0"/>
-              <a:t>12/08/17</a:t>
+              <a:t>12/09/17</a:t>
             </a:fld>
             <a:endParaRPr lang="en-US"/>
           </a:p>
@@ -5603,7 +5607,7 @@
           <a:p>
             <a:fld id="{ACB4D66B-B249-4FFD-A1BE-9D1F03DF6E29}" type="datetime1">
               <a:rPr lang="en-US" smtClean="0"/>
-              <a:t>12/08/17</a:t>
+              <a:t>12/09/17</a:t>
             </a:fld>
             <a:endParaRPr lang="en-US"/>
           </a:p>
@@ -5663,61 +5667,6 @@
               <a:t>3</a:t>
             </a:fld>
             <a:endParaRPr lang="en-US"/>
-          </a:p>
-        </p:txBody>
-      </p:sp>
-      <p:sp>
-        <p:nvSpPr>
-          <p:cNvPr id="11" name="TextBox 10">
-            <a:extLst>
-              <a:ext uri="{FF2B5EF4-FFF2-40B4-BE49-F238E27FC236}">
-                <a16:creationId xmlns:a16="http://schemas.microsoft.com/office/drawing/2014/main" id="{267A9BB4-E806-42C0-AE69-3DBCC8D6916A}"/>
-              </a:ext>
-            </a:extLst>
-          </p:cNvPr>
-          <p:cNvSpPr txBox="1"/>
-          <p:nvPr/>
-        </p:nvSpPr>
-        <p:spPr>
-          <a:xfrm>
-            <a:off x="7238199" y="3917482"/>
-            <a:ext cx="3821229" cy="2031325"/>
-          </a:xfrm>
-          <a:prstGeom prst="rect">
-            <a:avLst/>
-          </a:prstGeom>
-          <a:noFill/>
-          <a:ln>
-            <a:solidFill>
-              <a:schemeClr val="tx1"/>
-            </a:solidFill>
-          </a:ln>
-        </p:spPr>
-        <p:txBody>
-          <a:bodyPr wrap="square" rtlCol="0">
-            <a:spAutoFit/>
-          </a:bodyPr>
-          <a:lstStyle/>
-          <a:p>
-            <a:r>
-              <a:rPr lang="en-US" dirty="0"/>
-              <a:t>Place holder for diagram of intersection</a:t>
-            </a:r>
-          </a:p>
-          <a:p>
-            <a:endParaRPr lang="en-US" dirty="0"/>
-          </a:p>
-          <a:p>
-            <a:endParaRPr lang="en-US" dirty="0"/>
-          </a:p>
-          <a:p>
-            <a:endParaRPr lang="en-US" dirty="0"/>
-          </a:p>
-          <a:p>
-            <a:endParaRPr lang="en-US" dirty="0"/>
-          </a:p>
-          <a:p>
-            <a:endParaRPr lang="en-US" dirty="0"/>
           </a:p>
         </p:txBody>
       </p:sp>
@@ -6044,7 +5993,7 @@
           <a:p>
             <a:fld id="{ACB4D66B-B249-4FFD-A1BE-9D1F03DF6E29}" type="datetime1">
               <a:rPr lang="en-US" smtClean="0"/>
-              <a:t>12/08/17</a:t>
+              <a:t>12/09/17</a:t>
             </a:fld>
             <a:endParaRPr lang="en-US"/>
           </a:p>
@@ -6273,8 +6222,8 @@
           </a:p>
         </p:txBody>
       </p:sp>
-      <mc:AlternateContent xmlns:mc="http://schemas.openxmlformats.org/markup-compatibility/2006">
-        <mc:Choice xmlns:a14="http://schemas.microsoft.com/office/drawing/2010/main" Requires="a14">
+      <mc:AlternateContent xmlns:mc="http://schemas.openxmlformats.org/markup-compatibility/2006" xmlns:a14="http://schemas.microsoft.com/office/drawing/2010/main">
+        <mc:Choice Requires="a14">
           <p:sp>
             <p:nvSpPr>
               <p:cNvPr id="3" name="Content Placeholder 2">
@@ -6354,7 +6303,7 @@
             </p:txBody>
           </p:sp>
         </mc:Choice>
-        <mc:Fallback>
+        <mc:Fallback xmlns="">
           <p:sp>
             <p:nvSpPr>
               <p:cNvPr id="3" name="Content Placeholder 2">
@@ -6592,7 +6541,7 @@
           <a:p>
             <a:fld id="{ACB4D66B-B249-4FFD-A1BE-9D1F03DF6E29}" type="datetime1">
               <a:rPr lang="en-US" smtClean="0"/>
-              <a:t>12/08/17</a:t>
+              <a:t>12/09/17</a:t>
             </a:fld>
             <a:endParaRPr lang="en-US"/>
           </a:p>
@@ -6675,8 +6624,8 @@
             <a:chExt cx="10810675" cy="2660656"/>
           </a:xfrm>
         </p:grpSpPr>
-        <mc:AlternateContent xmlns:mc="http://schemas.openxmlformats.org/markup-compatibility/2006">
-          <mc:Choice xmlns:a14="http://schemas.microsoft.com/office/drawing/2010/main" Requires="a14">
+        <mc:AlternateContent xmlns:mc="http://schemas.openxmlformats.org/markup-compatibility/2006" xmlns:a14="http://schemas.microsoft.com/office/drawing/2010/main">
+          <mc:Choice Requires="a14">
             <p:sp>
               <p:nvSpPr>
                 <p:cNvPr id="11" name="TextBox 10">
@@ -6705,6 +6654,7 @@
                 </a:bodyPr>
                 <a:lstStyle/>
                 <a:p>
+                  <a:pPr/>
                   <a14:m>
                     <m:oMathPara xmlns:m="http://schemas.openxmlformats.org/officeDocument/2006/math">
                       <m:oMathParaPr>
@@ -7030,7 +6980,7 @@
               </p:txBody>
             </p:sp>
           </mc:Choice>
-          <mc:Fallback>
+          <mc:Fallback xmlns="">
             <p:sp>
               <p:nvSpPr>
                 <p:cNvPr id="11" name="TextBox 10">
@@ -7075,8 +7025,8 @@
             </p:sp>
           </mc:Fallback>
         </mc:AlternateContent>
-        <mc:AlternateContent xmlns:mc="http://schemas.openxmlformats.org/markup-compatibility/2006">
-          <mc:Choice xmlns:a14="http://schemas.microsoft.com/office/drawing/2010/main" Requires="a14">
+        <mc:AlternateContent xmlns:mc="http://schemas.openxmlformats.org/markup-compatibility/2006" xmlns:a14="http://schemas.microsoft.com/office/drawing/2010/main">
+          <mc:Choice Requires="a14">
             <p:sp>
               <p:nvSpPr>
                 <p:cNvPr id="12" name="TextBox 11">
@@ -7105,6 +7055,7 @@
                 </a:bodyPr>
                 <a:lstStyle/>
                 <a:p>
+                  <a:pPr/>
                   <a14:m>
                     <m:oMathPara xmlns:m="http://schemas.openxmlformats.org/officeDocument/2006/math">
                       <m:oMathParaPr>
@@ -7188,7 +7139,7 @@
               </p:txBody>
             </p:sp>
           </mc:Choice>
-          <mc:Fallback>
+          <mc:Fallback xmlns="">
             <p:sp>
               <p:nvSpPr>
                 <p:cNvPr id="12" name="TextBox 11">
@@ -7233,8 +7184,8 @@
             </p:sp>
           </mc:Fallback>
         </mc:AlternateContent>
-        <mc:AlternateContent xmlns:mc="http://schemas.openxmlformats.org/markup-compatibility/2006">
-          <mc:Choice xmlns:a14="http://schemas.microsoft.com/office/drawing/2010/main" Requires="a14">
+        <mc:AlternateContent xmlns:mc="http://schemas.openxmlformats.org/markup-compatibility/2006" xmlns:a14="http://schemas.microsoft.com/office/drawing/2010/main">
+          <mc:Choice Requires="a14">
             <p:sp>
               <p:nvSpPr>
                 <p:cNvPr id="13" name="TextBox 12">
@@ -7263,6 +7214,7 @@
                 </a:bodyPr>
                 <a:lstStyle/>
                 <a:p>
+                  <a:pPr/>
                   <a14:m>
                     <m:oMathPara xmlns:m="http://schemas.openxmlformats.org/officeDocument/2006/math">
                       <m:oMathParaPr>
@@ -7745,7 +7697,7 @@
               </p:txBody>
             </p:sp>
           </mc:Choice>
-          <mc:Fallback>
+          <mc:Fallback xmlns="">
             <p:sp>
               <p:nvSpPr>
                 <p:cNvPr id="13" name="TextBox 12">
@@ -8130,7 +8082,7 @@
           <a:p>
             <a:fld id="{ACB4D66B-B249-4FFD-A1BE-9D1F03DF6E29}" type="datetime1">
               <a:rPr lang="en-US" smtClean="0"/>
-              <a:t>12/08/17</a:t>
+              <a:t>12/09/17</a:t>
             </a:fld>
             <a:endParaRPr lang="en-US"/>
           </a:p>
@@ -8210,7 +8162,7 @@
               <p:nvPr>
                 <p:extLst>
                   <p:ext uri="{D42A27DB-BD31-4B8C-83A1-F6EECF244321}">
-                    <p14:modId xmlns:p14="http://schemas.microsoft.com/office/powerpoint/2010/main" val="1147202716"/>
+                    <p14:modId xmlns:p14="http://schemas.microsoft.com/office/powerpoint/2010/main" val="2194513776"/>
                   </p:ext>
                 </p:extLst>
               </p:nvPr>
@@ -8303,6 +8255,7 @@
                         <a:bodyPr/>
                         <a:lstStyle/>
                         <a:p>
+                          <a:pPr/>
                           <a14:m>
                             <m:oMathPara xmlns:m="http://schemas.openxmlformats.org/officeDocument/2006/math">
                               <m:oMathParaPr>
@@ -8438,12 +8391,31 @@
                                   </a:rPr>
                                   <m:t>/</m:t>
                                 </m:r>
-                                <m:r>
-                                  <a:rPr lang="en-US" sz="2000" b="0" i="1" smtClean="0">
-                                    <a:latin typeface="Cambria Math" panose="02040503050406030204" pitchFamily="18" charset="0"/>
-                                  </a:rPr>
-                                  <m:t>𝑠</m:t>
-                                </m:r>
+                                <m:sSup>
+                                  <m:sSupPr>
+                                    <m:ctrlPr>
+                                      <a:rPr lang="en-US" sz="2000" b="0" i="1" smtClean="0">
+                                        <a:latin typeface="Cambria Math" panose="02040503050406030204" pitchFamily="18" charset="0"/>
+                                      </a:rPr>
+                                    </m:ctrlPr>
+                                  </m:sSupPr>
+                                  <m:e>
+                                    <m:r>
+                                      <a:rPr lang="en-US" sz="2000" b="0" i="1" smtClean="0">
+                                        <a:latin typeface="Cambria Math" panose="02040503050406030204" pitchFamily="18" charset="0"/>
+                                      </a:rPr>
+                                      <m:t>𝑠</m:t>
+                                    </m:r>
+                                  </m:e>
+                                  <m:sup>
+                                    <m:r>
+                                      <a:rPr lang="en-US" sz="2000" b="0" i="1" smtClean="0">
+                                        <a:latin typeface="Cambria Math" panose="02040503050406030204" pitchFamily="18" charset="0"/>
+                                      </a:rPr>
+                                      <m:t>2</m:t>
+                                    </m:r>
+                                  </m:sup>
+                                </m:sSup>
                               </m:oMath>
                             </m:oMathPara>
                           </a14:m>
@@ -8464,6 +8436,7 @@
                         <a:bodyPr/>
                         <a:lstStyle/>
                         <a:p>
+                          <a:pPr/>
                           <a14:m>
                             <m:oMathPara xmlns:m="http://schemas.openxmlformats.org/officeDocument/2006/math">
                               <m:oMathParaPr>
@@ -8510,7 +8483,7 @@
                         <a:p>
                           <a:r>
                             <a:rPr lang="en-US" sz="2000" dirty="0"/>
-                            <a:t>Max desired braking of vehicle </a:t>
+                            <a:t>Max desired deceleration of vehicle </a:t>
                           </a:r>
                           <a14:m>
                             <m:oMath xmlns:m="http://schemas.openxmlformats.org/officeDocument/2006/math">
@@ -8606,6 +8579,7 @@
                         <a:bodyPr/>
                         <a:lstStyle/>
                         <a:p>
+                          <a:pPr/>
                           <a14:m>
                             <m:oMathPara xmlns:m="http://schemas.openxmlformats.org/officeDocument/2006/math">
                               <m:oMathParaPr>
@@ -8774,6 +8748,7 @@
                         <a:bodyPr/>
                         <a:lstStyle/>
                         <a:p>
+                          <a:pPr/>
                           <a14:m>
                             <m:oMathPara xmlns:m="http://schemas.openxmlformats.org/officeDocument/2006/math">
                               <m:oMathParaPr>
@@ -8893,19 +8868,7 @@
                                           <a:rPr lang="en-US" sz="2000" b="0" i="1" smtClean="0">
                                             <a:latin typeface="Cambria Math" panose="02040503050406030204" pitchFamily="18" charset="0"/>
                                           </a:rPr>
-                                          <m:t>20</m:t>
-                                        </m:r>
-                                        <m:r>
-                                          <a:rPr lang="en-US" sz="2000" b="0" i="1" smtClean="0">
-                                            <a:latin typeface="Cambria Math" panose="02040503050406030204" pitchFamily="18" charset="0"/>
-                                          </a:rPr>
-                                          <m:t>, </m:t>
-                                        </m:r>
-                                        <m:r>
-                                          <a:rPr lang="en-US" sz="2000" b="0" i="1" smtClean="0">
-                                            <a:latin typeface="Cambria Math" panose="02040503050406030204" pitchFamily="18" charset="0"/>
-                                          </a:rPr>
-                                          <m:t>3.2</m:t>
+                                          <m:t>20, 3.2</m:t>
                                         </m:r>
                                       </m:e>
                                       <m:sup>
@@ -8963,6 +8926,7 @@
                         <a:bodyPr/>
                         <a:lstStyle/>
                         <a:p>
+                          <a:pPr/>
                           <a14:m>
                             <m:oMathPara xmlns:m="http://schemas.openxmlformats.org/officeDocument/2006/math">
                               <m:oMathParaPr>
@@ -9064,6 +9028,7 @@
                         <a:bodyPr/>
                         <a:lstStyle/>
                         <a:p>
+                          <a:pPr/>
                           <a14:m>
                             <m:oMathPara xmlns:m="http://schemas.openxmlformats.org/officeDocument/2006/math">
                               <m:oMathParaPr>
@@ -9280,12 +9245,31 @@
                                   </a:rPr>
                                   <m:t>/</m:t>
                                 </m:r>
-                                <m:r>
-                                  <a:rPr lang="en-US" sz="2000" b="0" i="1" smtClean="0">
-                                    <a:latin typeface="Cambria Math" panose="02040503050406030204" pitchFamily="18" charset="0"/>
-                                  </a:rPr>
-                                  <m:t>𝑠</m:t>
-                                </m:r>
+                                <m:sSup>
+                                  <m:sSupPr>
+                                    <m:ctrlPr>
+                                      <a:rPr lang="en-US" sz="2000" b="0" i="1" smtClean="0">
+                                        <a:latin typeface="Cambria Math" panose="02040503050406030204" pitchFamily="18" charset="0"/>
+                                      </a:rPr>
+                                    </m:ctrlPr>
+                                  </m:sSupPr>
+                                  <m:e>
+                                    <m:r>
+                                      <a:rPr lang="en-US" sz="2000" b="0" i="1" smtClean="0">
+                                        <a:latin typeface="Cambria Math" panose="02040503050406030204" pitchFamily="18" charset="0"/>
+                                      </a:rPr>
+                                      <m:t>𝑠</m:t>
+                                    </m:r>
+                                  </m:e>
+                                  <m:sup>
+                                    <m:r>
+                                      <a:rPr lang="en-US" sz="2000" b="0" i="1" smtClean="0">
+                                        <a:latin typeface="Cambria Math" panose="02040503050406030204" pitchFamily="18" charset="0"/>
+                                      </a:rPr>
+                                      <m:t>2</m:t>
+                                    </m:r>
+                                  </m:sup>
+                                </m:sSup>
                               </m:oMath>
                             </m:oMathPara>
                           </a14:m>
@@ -9306,6 +9290,7 @@
                         <a:bodyPr/>
                         <a:lstStyle/>
                         <a:p>
+                          <a:pPr/>
                           <a14:m>
                             <m:oMathPara xmlns:m="http://schemas.openxmlformats.org/officeDocument/2006/math">
                               <m:oMathParaPr>
@@ -9395,6 +9380,7 @@
                         <a:bodyPr/>
                         <a:lstStyle/>
                         <a:p>
+                          <a:pPr/>
                           <a14:m>
                             <m:oMathPara xmlns:m="http://schemas.openxmlformats.org/officeDocument/2006/math">
                               <m:oMathParaPr>
@@ -9499,7 +9485,7 @@
               <p:nvPr>
                 <p:extLst>
                   <p:ext uri="{D42A27DB-BD31-4B8C-83A1-F6EECF244321}">
-                    <p14:modId xmlns:p14="http://schemas.microsoft.com/office/powerpoint/2010/main" val="1147202716"/>
+                    <p14:modId xmlns:p14="http://schemas.microsoft.com/office/powerpoint/2010/main" val="2194513776"/>
                   </p:ext>
                 </p:extLst>
               </p:nvPr>
@@ -10371,7 +10357,7 @@
           <a:p>
             <a:fld id="{ACB4D66B-B249-4FFD-A1BE-9D1F03DF6E29}" type="datetime1">
               <a:rPr lang="en-US" smtClean="0"/>
-              <a:t>12/08/17</a:t>
+              <a:t>12/09/17</a:t>
             </a:fld>
             <a:endParaRPr lang="en-US"/>
           </a:p>
@@ -10434,6 +10420,36 @@
           </a:p>
         </p:txBody>
       </p:sp>
+      <p:pic>
+        <p:nvPicPr>
+          <p:cNvPr id="11" name="Picture 10">
+            <a:extLst>
+              <a:ext uri="{FF2B5EF4-FFF2-40B4-BE49-F238E27FC236}">
+                <a16:creationId xmlns:a16="http://schemas.microsoft.com/office/drawing/2014/main" id="{89C43887-1623-47C9-8C5E-F11FBA118B1B}"/>
+              </a:ext>
+            </a:extLst>
+          </p:cNvPr>
+          <p:cNvPicPr>
+            <a:picLocks noChangeAspect="1"/>
+          </p:cNvPicPr>
+          <p:nvPr/>
+        </p:nvPicPr>
+        <p:blipFill>
+          <a:blip r:embed="rId3"/>
+          <a:stretch>
+            <a:fillRect/>
+          </a:stretch>
+        </p:blipFill>
+        <p:spPr>
+          <a:xfrm>
+            <a:off x="6008980" y="1342340"/>
+            <a:ext cx="6366330" cy="4834623"/>
+          </a:xfrm>
+          <a:prstGeom prst="rect">
+            <a:avLst/>
+          </a:prstGeom>
+        </p:spPr>
+      </p:pic>
     </p:spTree>
     <p:extLst>
       <p:ext uri="{BB962C8B-B14F-4D97-AF65-F5344CB8AC3E}">
@@ -10752,7 +10768,7 @@
           <a:p>
             <a:fld id="{ACB4D66B-B249-4FFD-A1BE-9D1F03DF6E29}" type="datetime1">
               <a:rPr lang="en-US" smtClean="0"/>
-              <a:t>12/08/17</a:t>
+              <a:t>12/09/17</a:t>
             </a:fld>
             <a:endParaRPr lang="en-US"/>
           </a:p>
@@ -10812,592 +10828,6 @@
               <a:t>8</a:t>
             </a:fld>
             <a:endParaRPr lang="en-US"/>
-          </a:p>
-        </p:txBody>
-      </p:sp>
-      <p:grpSp>
-        <p:nvGrpSpPr>
-          <p:cNvPr id="25" name="Group 24">
-            <a:extLst>
-              <a:ext uri="{FF2B5EF4-FFF2-40B4-BE49-F238E27FC236}">
-                <a16:creationId xmlns:a16="http://schemas.microsoft.com/office/drawing/2014/main" id="{794D5508-50E3-4D8A-8F9B-70A7556CA6F4}"/>
-              </a:ext>
-            </a:extLst>
-          </p:cNvPr>
-          <p:cNvGrpSpPr/>
-          <p:nvPr/>
-        </p:nvGrpSpPr>
-        <p:grpSpPr>
-          <a:xfrm>
-            <a:off x="2728982" y="627654"/>
-            <a:ext cx="6734036" cy="3890530"/>
-            <a:chOff x="2832710" y="366285"/>
-            <a:chExt cx="6734036" cy="3890530"/>
-          </a:xfrm>
-        </p:grpSpPr>
-        <p:pic>
-          <p:nvPicPr>
-            <p:cNvPr id="13" name="Picture 12">
-              <a:extLst>
-                <a:ext uri="{FF2B5EF4-FFF2-40B4-BE49-F238E27FC236}">
-                  <a16:creationId xmlns:a16="http://schemas.microsoft.com/office/drawing/2014/main" id="{57D85744-BD00-48DF-9A37-DAD7B68A58EA}"/>
-                </a:ext>
-              </a:extLst>
-            </p:cNvPr>
-            <p:cNvPicPr>
-              <a:picLocks noChangeAspect="1"/>
-            </p:cNvPicPr>
-            <p:nvPr/>
-          </p:nvPicPr>
-          <p:blipFill>
-            <a:blip r:embed="rId3"/>
-            <a:stretch>
-              <a:fillRect/>
-            </a:stretch>
-          </p:blipFill>
-          <p:spPr>
-            <a:xfrm>
-              <a:off x="2832710" y="366285"/>
-              <a:ext cx="6734036" cy="3767419"/>
-            </a:xfrm>
-            <a:prstGeom prst="rect">
-              <a:avLst/>
-            </a:prstGeom>
-          </p:spPr>
-        </p:pic>
-        <p:sp>
-          <p:nvSpPr>
-            <p:cNvPr id="15" name="TextBox 14">
-              <a:extLst>
-                <a:ext uri="{FF2B5EF4-FFF2-40B4-BE49-F238E27FC236}">
-                  <a16:creationId xmlns:a16="http://schemas.microsoft.com/office/drawing/2014/main" id="{09DC6097-0E0D-4645-B0BE-F2C5014D5793}"/>
-                </a:ext>
-              </a:extLst>
-            </p:cNvPr>
-            <p:cNvSpPr txBox="1"/>
-            <p:nvPr/>
-          </p:nvSpPr>
-          <p:spPr>
-            <a:xfrm>
-              <a:off x="3328149" y="3949038"/>
-              <a:ext cx="458780" cy="307777"/>
-            </a:xfrm>
-            <a:prstGeom prst="rect">
-              <a:avLst/>
-            </a:prstGeom>
-            <a:noFill/>
-          </p:spPr>
-          <p:txBody>
-            <a:bodyPr wrap="none" rtlCol="0">
-              <a:spAutoFit/>
-            </a:bodyPr>
-            <a:lstStyle/>
-            <a:p>
-              <a:r>
-                <a:rPr lang="en-US" sz="1400" dirty="0">
-                  <a:solidFill>
-                    <a:schemeClr val="tx1">
-                      <a:lumMod val="65000"/>
-                      <a:lumOff val="35000"/>
-                    </a:schemeClr>
-                  </a:solidFill>
-                </a:rPr>
-                <a:t>180</a:t>
-              </a:r>
-              <a:endParaRPr lang="en-US" dirty="0">
-                <a:solidFill>
-                  <a:schemeClr val="tx1">
-                    <a:lumMod val="65000"/>
-                    <a:lumOff val="35000"/>
-                  </a:schemeClr>
-                </a:solidFill>
-              </a:endParaRPr>
-            </a:p>
-          </p:txBody>
-        </p:sp>
-        <p:sp>
-          <p:nvSpPr>
-            <p:cNvPr id="16" name="TextBox 15">
-              <a:extLst>
-                <a:ext uri="{FF2B5EF4-FFF2-40B4-BE49-F238E27FC236}">
-                  <a16:creationId xmlns:a16="http://schemas.microsoft.com/office/drawing/2014/main" id="{885595D4-BBE0-4543-BB8F-2D8BB338937C}"/>
-                </a:ext>
-              </a:extLst>
-            </p:cNvPr>
-            <p:cNvSpPr txBox="1"/>
-            <p:nvPr/>
-          </p:nvSpPr>
-          <p:spPr>
-            <a:xfrm>
-              <a:off x="3967239" y="3949038"/>
-              <a:ext cx="458780" cy="307777"/>
-            </a:xfrm>
-            <a:prstGeom prst="rect">
-              <a:avLst/>
-            </a:prstGeom>
-            <a:noFill/>
-          </p:spPr>
-          <p:txBody>
-            <a:bodyPr wrap="none" rtlCol="0">
-              <a:spAutoFit/>
-            </a:bodyPr>
-            <a:lstStyle/>
-            <a:p>
-              <a:r>
-                <a:rPr lang="en-US" sz="1400" dirty="0">
-                  <a:solidFill>
-                    <a:schemeClr val="tx1">
-                      <a:lumMod val="65000"/>
-                      <a:lumOff val="35000"/>
-                    </a:schemeClr>
-                  </a:solidFill>
-                </a:rPr>
-                <a:t>249</a:t>
-              </a:r>
-              <a:endParaRPr lang="en-US" dirty="0">
-                <a:solidFill>
-                  <a:schemeClr val="tx1">
-                    <a:lumMod val="65000"/>
-                    <a:lumOff val="35000"/>
-                  </a:schemeClr>
-                </a:solidFill>
-              </a:endParaRPr>
-            </a:p>
-          </p:txBody>
-        </p:sp>
-        <p:sp>
-          <p:nvSpPr>
-            <p:cNvPr id="17" name="TextBox 16">
-              <a:extLst>
-                <a:ext uri="{FF2B5EF4-FFF2-40B4-BE49-F238E27FC236}">
-                  <a16:creationId xmlns:a16="http://schemas.microsoft.com/office/drawing/2014/main" id="{320B7683-003E-4BF5-A9E1-B016BDE26FA9}"/>
-                </a:ext>
-              </a:extLst>
-            </p:cNvPr>
-            <p:cNvSpPr txBox="1"/>
-            <p:nvPr/>
-          </p:nvSpPr>
-          <p:spPr>
-            <a:xfrm>
-              <a:off x="4606329" y="3949038"/>
-              <a:ext cx="458780" cy="307777"/>
-            </a:xfrm>
-            <a:prstGeom prst="rect">
-              <a:avLst/>
-            </a:prstGeom>
-            <a:noFill/>
-          </p:spPr>
-          <p:txBody>
-            <a:bodyPr wrap="none" rtlCol="0">
-              <a:spAutoFit/>
-            </a:bodyPr>
-            <a:lstStyle/>
-            <a:p>
-              <a:r>
-                <a:rPr lang="en-US" sz="1400" dirty="0">
-                  <a:solidFill>
-                    <a:schemeClr val="tx1">
-                      <a:lumMod val="65000"/>
-                      <a:lumOff val="35000"/>
-                    </a:schemeClr>
-                  </a:solidFill>
-                </a:rPr>
-                <a:t>318</a:t>
-              </a:r>
-              <a:endParaRPr lang="en-US" dirty="0">
-                <a:solidFill>
-                  <a:schemeClr val="tx1">
-                    <a:lumMod val="65000"/>
-                    <a:lumOff val="35000"/>
-                  </a:schemeClr>
-                </a:solidFill>
-              </a:endParaRPr>
-            </a:p>
-          </p:txBody>
-        </p:sp>
-        <p:sp>
-          <p:nvSpPr>
-            <p:cNvPr id="18" name="TextBox 17">
-              <a:extLst>
-                <a:ext uri="{FF2B5EF4-FFF2-40B4-BE49-F238E27FC236}">
-                  <a16:creationId xmlns:a16="http://schemas.microsoft.com/office/drawing/2014/main" id="{1C45340D-921B-4FEF-9F00-B327FC792E6A}"/>
-                </a:ext>
-              </a:extLst>
-            </p:cNvPr>
-            <p:cNvSpPr txBox="1"/>
-            <p:nvPr/>
-          </p:nvSpPr>
-          <p:spPr>
-            <a:xfrm>
-              <a:off x="5245419" y="3949038"/>
-              <a:ext cx="458780" cy="307777"/>
-            </a:xfrm>
-            <a:prstGeom prst="rect">
-              <a:avLst/>
-            </a:prstGeom>
-            <a:noFill/>
-          </p:spPr>
-          <p:txBody>
-            <a:bodyPr wrap="none" rtlCol="0">
-              <a:spAutoFit/>
-            </a:bodyPr>
-            <a:lstStyle/>
-            <a:p>
-              <a:r>
-                <a:rPr lang="en-US" sz="1400" dirty="0">
-                  <a:solidFill>
-                    <a:schemeClr val="tx1">
-                      <a:lumMod val="65000"/>
-                      <a:lumOff val="35000"/>
-                    </a:schemeClr>
-                  </a:solidFill>
-                </a:rPr>
-                <a:t>387</a:t>
-              </a:r>
-              <a:endParaRPr lang="en-US" dirty="0">
-                <a:solidFill>
-                  <a:schemeClr val="tx1">
-                    <a:lumMod val="65000"/>
-                    <a:lumOff val="35000"/>
-                  </a:schemeClr>
-                </a:solidFill>
-              </a:endParaRPr>
-            </a:p>
-          </p:txBody>
-        </p:sp>
-        <p:sp>
-          <p:nvSpPr>
-            <p:cNvPr id="19" name="TextBox 18">
-              <a:extLst>
-                <a:ext uri="{FF2B5EF4-FFF2-40B4-BE49-F238E27FC236}">
-                  <a16:creationId xmlns:a16="http://schemas.microsoft.com/office/drawing/2014/main" id="{74FDA698-14B7-4D00-AA5C-6D062927E376}"/>
-                </a:ext>
-              </a:extLst>
-            </p:cNvPr>
-            <p:cNvSpPr txBox="1"/>
-            <p:nvPr/>
-          </p:nvSpPr>
-          <p:spPr>
-            <a:xfrm>
-              <a:off x="5884509" y="3949038"/>
-              <a:ext cx="458780" cy="307777"/>
-            </a:xfrm>
-            <a:prstGeom prst="rect">
-              <a:avLst/>
-            </a:prstGeom>
-            <a:noFill/>
-          </p:spPr>
-          <p:txBody>
-            <a:bodyPr wrap="none" rtlCol="0">
-              <a:spAutoFit/>
-            </a:bodyPr>
-            <a:lstStyle/>
-            <a:p>
-              <a:r>
-                <a:rPr lang="en-US" sz="1400" dirty="0">
-                  <a:solidFill>
-                    <a:schemeClr val="tx1">
-                      <a:lumMod val="65000"/>
-                      <a:lumOff val="35000"/>
-                    </a:schemeClr>
-                  </a:solidFill>
-                </a:rPr>
-                <a:t>456</a:t>
-              </a:r>
-              <a:endParaRPr lang="en-US" dirty="0">
-                <a:solidFill>
-                  <a:schemeClr val="tx1">
-                    <a:lumMod val="65000"/>
-                    <a:lumOff val="35000"/>
-                  </a:schemeClr>
-                </a:solidFill>
-              </a:endParaRPr>
-            </a:p>
-          </p:txBody>
-        </p:sp>
-        <p:sp>
-          <p:nvSpPr>
-            <p:cNvPr id="20" name="TextBox 19">
-              <a:extLst>
-                <a:ext uri="{FF2B5EF4-FFF2-40B4-BE49-F238E27FC236}">
-                  <a16:creationId xmlns:a16="http://schemas.microsoft.com/office/drawing/2014/main" id="{C146EBB8-03AB-45B7-837F-2C8AA04550E0}"/>
-                </a:ext>
-              </a:extLst>
-            </p:cNvPr>
-            <p:cNvSpPr txBox="1"/>
-            <p:nvPr/>
-          </p:nvSpPr>
-          <p:spPr>
-            <a:xfrm>
-              <a:off x="6523599" y="3949038"/>
-              <a:ext cx="458780" cy="307777"/>
-            </a:xfrm>
-            <a:prstGeom prst="rect">
-              <a:avLst/>
-            </a:prstGeom>
-            <a:noFill/>
-          </p:spPr>
-          <p:txBody>
-            <a:bodyPr wrap="none" rtlCol="0">
-              <a:spAutoFit/>
-            </a:bodyPr>
-            <a:lstStyle/>
-            <a:p>
-              <a:r>
-                <a:rPr lang="en-US" sz="1400" dirty="0">
-                  <a:solidFill>
-                    <a:schemeClr val="tx1">
-                      <a:lumMod val="65000"/>
-                      <a:lumOff val="35000"/>
-                    </a:schemeClr>
-                  </a:solidFill>
-                </a:rPr>
-                <a:t>525</a:t>
-              </a:r>
-              <a:endParaRPr lang="en-US" dirty="0">
-                <a:solidFill>
-                  <a:schemeClr val="tx1">
-                    <a:lumMod val="65000"/>
-                    <a:lumOff val="35000"/>
-                  </a:schemeClr>
-                </a:solidFill>
-              </a:endParaRPr>
-            </a:p>
-          </p:txBody>
-        </p:sp>
-        <p:sp>
-          <p:nvSpPr>
-            <p:cNvPr id="21" name="TextBox 20">
-              <a:extLst>
-                <a:ext uri="{FF2B5EF4-FFF2-40B4-BE49-F238E27FC236}">
-                  <a16:creationId xmlns:a16="http://schemas.microsoft.com/office/drawing/2014/main" id="{585A096F-A108-46D4-8919-86E901BF142A}"/>
-                </a:ext>
-              </a:extLst>
-            </p:cNvPr>
-            <p:cNvSpPr txBox="1"/>
-            <p:nvPr/>
-          </p:nvSpPr>
-          <p:spPr>
-            <a:xfrm>
-              <a:off x="7162689" y="3949038"/>
-              <a:ext cx="458780" cy="307777"/>
-            </a:xfrm>
-            <a:prstGeom prst="rect">
-              <a:avLst/>
-            </a:prstGeom>
-            <a:noFill/>
-          </p:spPr>
-          <p:txBody>
-            <a:bodyPr wrap="none" rtlCol="0">
-              <a:spAutoFit/>
-            </a:bodyPr>
-            <a:lstStyle/>
-            <a:p>
-              <a:r>
-                <a:rPr lang="en-US" sz="1400" dirty="0">
-                  <a:solidFill>
-                    <a:schemeClr val="tx1">
-                      <a:lumMod val="65000"/>
-                      <a:lumOff val="35000"/>
-                    </a:schemeClr>
-                  </a:solidFill>
-                </a:rPr>
-                <a:t>594</a:t>
-              </a:r>
-              <a:endParaRPr lang="en-US" dirty="0">
-                <a:solidFill>
-                  <a:schemeClr val="tx1">
-                    <a:lumMod val="65000"/>
-                    <a:lumOff val="35000"/>
-                  </a:schemeClr>
-                </a:solidFill>
-              </a:endParaRPr>
-            </a:p>
-          </p:txBody>
-        </p:sp>
-        <p:sp>
-          <p:nvSpPr>
-            <p:cNvPr id="22" name="TextBox 21">
-              <a:extLst>
-                <a:ext uri="{FF2B5EF4-FFF2-40B4-BE49-F238E27FC236}">
-                  <a16:creationId xmlns:a16="http://schemas.microsoft.com/office/drawing/2014/main" id="{9FE040E5-AA0F-430A-A15B-7F2E6D1CB7B8}"/>
-                </a:ext>
-              </a:extLst>
-            </p:cNvPr>
-            <p:cNvSpPr txBox="1"/>
-            <p:nvPr/>
-          </p:nvSpPr>
-          <p:spPr>
-            <a:xfrm>
-              <a:off x="7801779" y="3949038"/>
-              <a:ext cx="458780" cy="307777"/>
-            </a:xfrm>
-            <a:prstGeom prst="rect">
-              <a:avLst/>
-            </a:prstGeom>
-            <a:noFill/>
-          </p:spPr>
-          <p:txBody>
-            <a:bodyPr wrap="none" rtlCol="0">
-              <a:spAutoFit/>
-            </a:bodyPr>
-            <a:lstStyle/>
-            <a:p>
-              <a:r>
-                <a:rPr lang="en-US" sz="1400" dirty="0">
-                  <a:solidFill>
-                    <a:schemeClr val="tx1">
-                      <a:lumMod val="65000"/>
-                      <a:lumOff val="35000"/>
-                    </a:schemeClr>
-                  </a:solidFill>
-                </a:rPr>
-                <a:t>663</a:t>
-              </a:r>
-              <a:endParaRPr lang="en-US" dirty="0">
-                <a:solidFill>
-                  <a:schemeClr val="tx1">
-                    <a:lumMod val="65000"/>
-                    <a:lumOff val="35000"/>
-                  </a:schemeClr>
-                </a:solidFill>
-              </a:endParaRPr>
-            </a:p>
-          </p:txBody>
-        </p:sp>
-        <p:sp>
-          <p:nvSpPr>
-            <p:cNvPr id="23" name="TextBox 22">
-              <a:extLst>
-                <a:ext uri="{FF2B5EF4-FFF2-40B4-BE49-F238E27FC236}">
-                  <a16:creationId xmlns:a16="http://schemas.microsoft.com/office/drawing/2014/main" id="{AF14AE3C-DA16-41EE-B3B9-FB197A7266E6}"/>
-                </a:ext>
-              </a:extLst>
-            </p:cNvPr>
-            <p:cNvSpPr txBox="1"/>
-            <p:nvPr/>
-          </p:nvSpPr>
-          <p:spPr>
-            <a:xfrm>
-              <a:off x="8440869" y="3949038"/>
-              <a:ext cx="458780" cy="307777"/>
-            </a:xfrm>
-            <a:prstGeom prst="rect">
-              <a:avLst/>
-            </a:prstGeom>
-            <a:noFill/>
-          </p:spPr>
-          <p:txBody>
-            <a:bodyPr wrap="none" rtlCol="0">
-              <a:spAutoFit/>
-            </a:bodyPr>
-            <a:lstStyle/>
-            <a:p>
-              <a:r>
-                <a:rPr lang="en-US" sz="1400" dirty="0">
-                  <a:solidFill>
-                    <a:schemeClr val="tx1">
-                      <a:lumMod val="65000"/>
-                      <a:lumOff val="35000"/>
-                    </a:schemeClr>
-                  </a:solidFill>
-                </a:rPr>
-                <a:t>732</a:t>
-              </a:r>
-              <a:endParaRPr lang="en-US" dirty="0">
-                <a:solidFill>
-                  <a:schemeClr val="tx1">
-                    <a:lumMod val="65000"/>
-                    <a:lumOff val="35000"/>
-                  </a:schemeClr>
-                </a:solidFill>
-              </a:endParaRPr>
-            </a:p>
-          </p:txBody>
-        </p:sp>
-        <p:sp>
-          <p:nvSpPr>
-            <p:cNvPr id="24" name="TextBox 23">
-              <a:extLst>
-                <a:ext uri="{FF2B5EF4-FFF2-40B4-BE49-F238E27FC236}">
-                  <a16:creationId xmlns:a16="http://schemas.microsoft.com/office/drawing/2014/main" id="{4DC669F2-573C-410A-B81E-6427B669AAAD}"/>
-                </a:ext>
-              </a:extLst>
-            </p:cNvPr>
-            <p:cNvSpPr txBox="1"/>
-            <p:nvPr/>
-          </p:nvSpPr>
-          <p:spPr>
-            <a:xfrm>
-              <a:off x="9079955" y="3949038"/>
-              <a:ext cx="458780" cy="307777"/>
-            </a:xfrm>
-            <a:prstGeom prst="rect">
-              <a:avLst/>
-            </a:prstGeom>
-            <a:noFill/>
-          </p:spPr>
-          <p:txBody>
-            <a:bodyPr wrap="none" rtlCol="0">
-              <a:spAutoFit/>
-            </a:bodyPr>
-            <a:lstStyle/>
-            <a:p>
-              <a:r>
-                <a:rPr lang="en-US" sz="1400" dirty="0">
-                  <a:solidFill>
-                    <a:schemeClr val="tx1">
-                      <a:lumMod val="65000"/>
-                      <a:lumOff val="35000"/>
-                    </a:schemeClr>
-                  </a:solidFill>
-                </a:rPr>
-                <a:t>801</a:t>
-              </a:r>
-              <a:endParaRPr lang="en-US" dirty="0">
-                <a:solidFill>
-                  <a:schemeClr val="tx1">
-                    <a:lumMod val="65000"/>
-                    <a:lumOff val="35000"/>
-                  </a:schemeClr>
-                </a:solidFill>
-              </a:endParaRPr>
-            </a:p>
-          </p:txBody>
-        </p:sp>
-      </p:grpSp>
-      <p:sp>
-        <p:nvSpPr>
-          <p:cNvPr id="26" name="TextBox 25">
-            <a:extLst>
-              <a:ext uri="{FF2B5EF4-FFF2-40B4-BE49-F238E27FC236}">
-                <a16:creationId xmlns:a16="http://schemas.microsoft.com/office/drawing/2014/main" id="{0BE53286-2285-4176-9B52-6D5D4794EBBA}"/>
-              </a:ext>
-            </a:extLst>
-          </p:cNvPr>
-          <p:cNvSpPr txBox="1"/>
-          <p:nvPr/>
-        </p:nvSpPr>
-        <p:spPr>
-          <a:xfrm>
-            <a:off x="5650092" y="4468452"/>
-            <a:ext cx="1536511" cy="369332"/>
-          </a:xfrm>
-          <a:prstGeom prst="rect">
-            <a:avLst/>
-          </a:prstGeom>
-          <a:noFill/>
-        </p:spPr>
-        <p:txBody>
-          <a:bodyPr wrap="none" rtlCol="0">
-            <a:spAutoFit/>
-          </a:bodyPr>
-          <a:lstStyle/>
-          <a:p>
-            <a:r>
-              <a:rPr lang="en-US" dirty="0"/>
-              <a:t>Travel Time (s)</a:t>
-            </a:r>
           </a:p>
         </p:txBody>
       </p:sp>
@@ -11682,7 +11112,7 @@
           <a:p>
             <a:fld id="{ACB4D66B-B249-4FFD-A1BE-9D1F03DF6E29}" type="datetime1">
               <a:rPr lang="en-US" smtClean="0"/>
-              <a:t>12/08/17</a:t>
+              <a:t>12/09/17</a:t>
             </a:fld>
             <a:endParaRPr lang="en-US"/>
           </a:p>

</xml_diff>

<commit_message>
updated presentation and results files
</commit_message>
<xml_diff>
--- a/CE391F_project_presentation_alexander_dunn.pptx
+++ b/CE391F_project_presentation_alexander_dunn.pptx
@@ -5,7 +5,7 @@
     <p:sldMasterId id="2147483648" r:id="rId1"/>
   </p:sldMasterIdLst>
   <p:notesMasterIdLst>
-    <p:notesMasterId r:id="rId13"/>
+    <p:notesMasterId r:id="rId14"/>
   </p:notesMasterIdLst>
   <p:sldIdLst>
     <p:sldId id="256" r:id="rId2"/>
@@ -15,10 +15,11 @@
     <p:sldId id="270" r:id="rId6"/>
     <p:sldId id="274" r:id="rId7"/>
     <p:sldId id="271" r:id="rId8"/>
-    <p:sldId id="272" r:id="rId9"/>
-    <p:sldId id="273" r:id="rId10"/>
-    <p:sldId id="264" r:id="rId11"/>
-    <p:sldId id="267" r:id="rId12"/>
+    <p:sldId id="275" r:id="rId9"/>
+    <p:sldId id="272" r:id="rId10"/>
+    <p:sldId id="273" r:id="rId11"/>
+    <p:sldId id="264" r:id="rId12"/>
+    <p:sldId id="267" r:id="rId13"/>
   </p:sldIdLst>
   <p:sldSz cx="12192000" cy="6858000"/>
   <p:notesSz cx="6858000" cy="9144000"/>
@@ -4015,6 +4016,350 @@
           <p:cNvPr id="2" name="Title 1">
             <a:extLst>
               <a:ext uri="{FF2B5EF4-FFF2-40B4-BE49-F238E27FC236}">
+                <a16:creationId xmlns:a16="http://schemas.microsoft.com/office/drawing/2014/main" id="{FE524215-47FE-459B-8956-285C66422CCE}"/>
+              </a:ext>
+            </a:extLst>
+          </p:cNvPr>
+          <p:cNvSpPr>
+            <a:spLocks noGrp="1"/>
+          </p:cNvSpPr>
+          <p:nvPr>
+            <p:ph type="title"/>
+          </p:nvPr>
+        </p:nvSpPr>
+        <p:spPr/>
+        <p:txBody>
+          <a:bodyPr/>
+          <a:lstStyle/>
+          <a:p>
+            <a:r>
+              <a:rPr lang="en-US" dirty="0"/>
+              <a:t>Conclusions</a:t>
+            </a:r>
+          </a:p>
+        </p:txBody>
+      </p:sp>
+      <p:sp>
+        <p:nvSpPr>
+          <p:cNvPr id="3" name="Content Placeholder 2">
+            <a:extLst>
+              <a:ext uri="{FF2B5EF4-FFF2-40B4-BE49-F238E27FC236}">
+                <a16:creationId xmlns:a16="http://schemas.microsoft.com/office/drawing/2014/main" id="{8A5E7AC2-F6BE-415A-9708-200667A18C06}"/>
+              </a:ext>
+            </a:extLst>
+          </p:cNvPr>
+          <p:cNvSpPr>
+            <a:spLocks noGrp="1"/>
+          </p:cNvSpPr>
+          <p:nvPr>
+            <p:ph idx="1"/>
+          </p:nvPr>
+        </p:nvSpPr>
+        <p:spPr/>
+        <p:txBody>
+          <a:bodyPr/>
+          <a:lstStyle/>
+          <a:p>
+            <a:endParaRPr lang="en-US" dirty="0"/>
+          </a:p>
+        </p:txBody>
+      </p:sp>
+      <p:grpSp>
+        <p:nvGrpSpPr>
+          <p:cNvPr id="7" name="Group 6">
+            <a:extLst>
+              <a:ext uri="{FF2B5EF4-FFF2-40B4-BE49-F238E27FC236}">
+                <a16:creationId xmlns:a16="http://schemas.microsoft.com/office/drawing/2014/main" id="{FBD5E95B-7A80-4F14-BE41-12EC3810C34F}"/>
+              </a:ext>
+            </a:extLst>
+          </p:cNvPr>
+          <p:cNvGrpSpPr/>
+          <p:nvPr/>
+        </p:nvGrpSpPr>
+        <p:grpSpPr>
+          <a:xfrm>
+            <a:off x="-112144" y="83977"/>
+            <a:ext cx="12232256" cy="715633"/>
+            <a:chOff x="-112144" y="83977"/>
+            <a:chExt cx="12232256" cy="715633"/>
+          </a:xfrm>
+        </p:grpSpPr>
+        <p:pic>
+          <p:nvPicPr>
+            <p:cNvPr id="4" name="Picture 2" descr="Image result for university of texas civil engineering">
+              <a:extLst>
+                <a:ext uri="{FF2B5EF4-FFF2-40B4-BE49-F238E27FC236}">
+                  <a16:creationId xmlns:a16="http://schemas.microsoft.com/office/drawing/2014/main" id="{A07C6296-388B-4E50-B266-28FCFA6F526A}"/>
+                </a:ext>
+              </a:extLst>
+            </p:cNvPr>
+            <p:cNvPicPr>
+              <a:picLocks noChangeAspect="1" noChangeArrowheads="1"/>
+            </p:cNvPicPr>
+            <p:nvPr/>
+          </p:nvPicPr>
+          <p:blipFill>
+            <a:blip r:embed="rId2">
+              <a:extLst>
+                <a:ext uri="{28A0092B-C50C-407E-A947-70E740481C1C}">
+                  <a14:useLocalDpi xmlns:a14="http://schemas.microsoft.com/office/drawing/2010/main" val="0"/>
+                </a:ext>
+              </a:extLst>
+            </a:blip>
+            <a:srcRect/>
+            <a:stretch>
+              <a:fillRect/>
+            </a:stretch>
+          </p:blipFill>
+          <p:spPr bwMode="auto">
+            <a:xfrm>
+              <a:off x="9359659" y="83977"/>
+              <a:ext cx="2760453" cy="715633"/>
+            </a:xfrm>
+            <a:prstGeom prst="rect">
+              <a:avLst/>
+            </a:prstGeom>
+            <a:noFill/>
+            <a:extLst>
+              <a:ext uri="{909E8E84-426E-40DD-AFC4-6F175D3DCCD1}">
+                <a14:hiddenFill xmlns:a14="http://schemas.microsoft.com/office/drawing/2010/main">
+                  <a:solidFill>
+                    <a:srgbClr val="FFFFFF"/>
+                  </a:solidFill>
+                </a14:hiddenFill>
+              </a:ext>
+            </a:extLst>
+          </p:spPr>
+        </p:pic>
+        <p:sp>
+          <p:nvSpPr>
+            <p:cNvPr id="5" name="Rectangle 4">
+              <a:extLst>
+                <a:ext uri="{FF2B5EF4-FFF2-40B4-BE49-F238E27FC236}">
+                  <a16:creationId xmlns:a16="http://schemas.microsoft.com/office/drawing/2014/main" id="{D4B9F056-4D2B-4697-B3DB-8A3F556D32EA}"/>
+                </a:ext>
+              </a:extLst>
+            </p:cNvPr>
+            <p:cNvSpPr/>
+            <p:nvPr/>
+          </p:nvSpPr>
+          <p:spPr>
+            <a:xfrm flipV="1">
+              <a:off x="-112143" y="113273"/>
+              <a:ext cx="9421243" cy="58176"/>
+            </a:xfrm>
+            <a:prstGeom prst="rect">
+              <a:avLst/>
+            </a:prstGeom>
+            <a:solidFill>
+              <a:srgbClr val="CA5C00"/>
+            </a:solidFill>
+            <a:ln>
+              <a:noFill/>
+            </a:ln>
+          </p:spPr>
+          <p:style>
+            <a:lnRef idx="2">
+              <a:schemeClr val="accent1">
+                <a:shade val="50000"/>
+              </a:schemeClr>
+            </a:lnRef>
+            <a:fillRef idx="1">
+              <a:schemeClr val="accent1"/>
+            </a:fillRef>
+            <a:effectRef idx="0">
+              <a:schemeClr val="accent1"/>
+            </a:effectRef>
+            <a:fontRef idx="minor">
+              <a:schemeClr val="lt1"/>
+            </a:fontRef>
+          </p:style>
+          <p:txBody>
+            <a:bodyPr rtlCol="0" anchor="ctr"/>
+            <a:lstStyle/>
+            <a:p>
+              <a:pPr algn="ctr"/>
+              <a:endParaRPr lang="en-US"/>
+            </a:p>
+          </p:txBody>
+        </p:sp>
+        <p:sp>
+          <p:nvSpPr>
+            <p:cNvPr id="6" name="Rectangle 5">
+              <a:extLst>
+                <a:ext uri="{FF2B5EF4-FFF2-40B4-BE49-F238E27FC236}">
+                  <a16:creationId xmlns:a16="http://schemas.microsoft.com/office/drawing/2014/main" id="{0BAE1D36-DC61-4B4F-9A4F-CCC7B5726190}"/>
+                </a:ext>
+              </a:extLst>
+            </p:cNvPr>
+            <p:cNvSpPr/>
+            <p:nvPr/>
+          </p:nvSpPr>
+          <p:spPr>
+            <a:xfrm flipV="1">
+              <a:off x="-112144" y="197693"/>
+              <a:ext cx="9421243" cy="27432"/>
+            </a:xfrm>
+            <a:prstGeom prst="rect">
+              <a:avLst/>
+            </a:prstGeom>
+            <a:solidFill>
+              <a:schemeClr val="tx1">
+                <a:lumMod val="75000"/>
+                <a:lumOff val="25000"/>
+              </a:schemeClr>
+            </a:solidFill>
+            <a:ln>
+              <a:noFill/>
+            </a:ln>
+          </p:spPr>
+          <p:style>
+            <a:lnRef idx="2">
+              <a:schemeClr val="accent1">
+                <a:shade val="50000"/>
+              </a:schemeClr>
+            </a:lnRef>
+            <a:fillRef idx="1">
+              <a:schemeClr val="accent1"/>
+            </a:fillRef>
+            <a:effectRef idx="0">
+              <a:schemeClr val="accent1"/>
+            </a:effectRef>
+            <a:fontRef idx="minor">
+              <a:schemeClr val="lt1"/>
+            </a:fontRef>
+          </p:style>
+          <p:txBody>
+            <a:bodyPr rtlCol="0" anchor="ctr"/>
+            <a:lstStyle/>
+            <a:p>
+              <a:pPr algn="ctr"/>
+              <a:endParaRPr lang="en-US"/>
+            </a:p>
+          </p:txBody>
+        </p:sp>
+      </p:grpSp>
+      <p:sp>
+        <p:nvSpPr>
+          <p:cNvPr id="8" name="Date Placeholder 7">
+            <a:extLst>
+              <a:ext uri="{FF2B5EF4-FFF2-40B4-BE49-F238E27FC236}">
+                <a16:creationId xmlns:a16="http://schemas.microsoft.com/office/drawing/2014/main" id="{BAC97C42-516F-40DB-AA2B-9DA4417FDC41}"/>
+              </a:ext>
+            </a:extLst>
+          </p:cNvPr>
+          <p:cNvSpPr>
+            <a:spLocks noGrp="1"/>
+          </p:cNvSpPr>
+          <p:nvPr>
+            <p:ph type="dt" sz="half" idx="10"/>
+          </p:nvPr>
+        </p:nvSpPr>
+        <p:spPr/>
+        <p:txBody>
+          <a:bodyPr/>
+          <a:lstStyle/>
+          <a:p>
+            <a:fld id="{ACB4D66B-B249-4FFD-A1BE-9D1F03DF6E29}" type="datetime1">
+              <a:rPr lang="en-US" smtClean="0"/>
+              <a:t>12/09/17</a:t>
+            </a:fld>
+            <a:endParaRPr lang="en-US"/>
+          </a:p>
+        </p:txBody>
+      </p:sp>
+      <p:sp>
+        <p:nvSpPr>
+          <p:cNvPr id="9" name="Footer Placeholder 8">
+            <a:extLst>
+              <a:ext uri="{FF2B5EF4-FFF2-40B4-BE49-F238E27FC236}">
+                <a16:creationId xmlns:a16="http://schemas.microsoft.com/office/drawing/2014/main" id="{620D2907-A9FF-48B4-9DBC-8834D19E9984}"/>
+              </a:ext>
+            </a:extLst>
+          </p:cNvPr>
+          <p:cNvSpPr>
+            <a:spLocks noGrp="1"/>
+          </p:cNvSpPr>
+          <p:nvPr>
+            <p:ph type="ftr" sz="quarter" idx="11"/>
+          </p:nvPr>
+        </p:nvSpPr>
+        <p:spPr/>
+        <p:txBody>
+          <a:bodyPr/>
+          <a:lstStyle/>
+          <a:p>
+            <a:r>
+              <a:rPr lang="en-US" dirty="0"/>
+              <a:t>Alexander &amp; Dunn</a:t>
+            </a:r>
+          </a:p>
+        </p:txBody>
+      </p:sp>
+      <p:sp>
+        <p:nvSpPr>
+          <p:cNvPr id="10" name="Slide Number Placeholder 9">
+            <a:extLst>
+              <a:ext uri="{FF2B5EF4-FFF2-40B4-BE49-F238E27FC236}">
+                <a16:creationId xmlns:a16="http://schemas.microsoft.com/office/drawing/2014/main" id="{22F23D3C-2CBE-4F4A-BAF7-BE418C10236A}"/>
+              </a:ext>
+            </a:extLst>
+          </p:cNvPr>
+          <p:cNvSpPr>
+            <a:spLocks noGrp="1"/>
+          </p:cNvSpPr>
+          <p:nvPr>
+            <p:ph type="sldNum" sz="quarter" idx="12"/>
+          </p:nvPr>
+        </p:nvSpPr>
+        <p:spPr/>
+        <p:txBody>
+          <a:bodyPr/>
+          <a:lstStyle/>
+          <a:p>
+            <a:fld id="{51DA1E1D-CF76-435A-8B16-6A181A4C66FE}" type="slidenum">
+              <a:rPr lang="en-US" smtClean="0"/>
+              <a:t>10</a:t>
+            </a:fld>
+            <a:endParaRPr lang="en-US"/>
+          </a:p>
+        </p:txBody>
+      </p:sp>
+    </p:spTree>
+    <p:extLst>
+      <p:ext uri="{BB962C8B-B14F-4D97-AF65-F5344CB8AC3E}">
+        <p14:creationId xmlns:p14="http://schemas.microsoft.com/office/powerpoint/2010/main" val="2127349954"/>
+      </p:ext>
+    </p:extLst>
+  </p:cSld>
+  <p:clrMapOvr>
+    <a:masterClrMapping/>
+  </p:clrMapOvr>
+</p:sld>
+</file>
+
+<file path=ppt/slides/slide11.xml><?xml version="1.0" encoding="utf-8"?>
+<p:sld xmlns:a="http://schemas.openxmlformats.org/drawingml/2006/main" xmlns:r="http://schemas.openxmlformats.org/officeDocument/2006/relationships" xmlns:p="http://schemas.openxmlformats.org/presentationml/2006/main">
+  <p:cSld>
+    <p:spTree>
+      <p:nvGrpSpPr>
+        <p:cNvPr id="1" name=""/>
+        <p:cNvGrpSpPr/>
+        <p:nvPr/>
+      </p:nvGrpSpPr>
+      <p:grpSpPr>
+        <a:xfrm>
+          <a:off x="0" y="0"/>
+          <a:ext cx="0" cy="0"/>
+          <a:chOff x="0" y="0"/>
+          <a:chExt cx="0" cy="0"/>
+        </a:xfrm>
+      </p:grpSpPr>
+      <p:sp>
+        <p:nvSpPr>
+          <p:cNvPr id="2" name="Title 1">
+            <a:extLst>
+              <a:ext uri="{FF2B5EF4-FFF2-40B4-BE49-F238E27FC236}">
                 <a16:creationId xmlns:a16="http://schemas.microsoft.com/office/drawing/2014/main" id="{60F7AD9E-0A70-42F5-9BDE-CF4402D3B0E1}"/>
               </a:ext>
             </a:extLst>
@@ -4309,7 +4654,7 @@
 </p:sld>
 </file>
 
-<file path=ppt/slides/slide11.xml><?xml version="1.0" encoding="utf-8"?>
+<file path=ppt/slides/slide12.xml><?xml version="1.0" encoding="utf-8"?>
 <p:sld xmlns:a="http://schemas.openxmlformats.org/drawingml/2006/main" xmlns:r="http://schemas.openxmlformats.org/officeDocument/2006/relationships" xmlns:p="http://schemas.openxmlformats.org/presentationml/2006/main">
   <p:cSld>
     <p:spTree>
@@ -4922,7 +5267,7 @@
           <a:p>
             <a:fld id="{51DA1E1D-CF76-435A-8B16-6A181A4C66FE}" type="slidenum">
               <a:rPr lang="en-US" smtClean="0"/>
-              <a:t>11</a:t>
+              <a:t>12</a:t>
             </a:fld>
             <a:endParaRPr lang="en-US"/>
           </a:p>
@@ -5392,13 +5737,20 @@
           <a:p>
             <a:r>
               <a:rPr lang="en-US" dirty="0"/>
-              <a:t>V2V and V2I</a:t>
+              <a:t>What is V2I communication?</a:t>
             </a:r>
           </a:p>
           <a:p>
             <a:r>
               <a:rPr lang="en-US" dirty="0"/>
               <a:t>Will’s previous research</a:t>
+            </a:r>
+          </a:p>
+          <a:p>
+            <a:pPr lvl="1"/>
+            <a:r>
+              <a:rPr lang="en-US" dirty="0"/>
+              <a:t>V2I-based signal priority</a:t>
             </a:r>
           </a:p>
           <a:p>
@@ -6146,8 +6498,8 @@
         </p:blipFill>
         <p:spPr bwMode="auto">
           <a:xfrm>
-            <a:off x="4226944" y="5543132"/>
-            <a:ext cx="3269412" cy="787033"/>
+            <a:off x="4906492" y="5670147"/>
+            <a:ext cx="2632996" cy="633831"/>
           </a:xfrm>
           <a:prstGeom prst="rect">
             <a:avLst/>
@@ -7879,7 +8231,7 @@
           <a:p>
             <a:r>
               <a:rPr lang="en-US" dirty="0"/>
-              <a:t>Gipps’ Model</a:t>
+              <a:t>Gipps’ Model Inputs</a:t>
             </a:r>
           </a:p>
         </p:txBody>
@@ -8145,8 +8497,8 @@
           </a:p>
         </p:txBody>
       </p:sp>
-      <mc:AlternateContent xmlns:mc="http://schemas.openxmlformats.org/markup-compatibility/2006">
-        <mc:Choice xmlns:a14="http://schemas.microsoft.com/office/drawing/2010/main" Requires="a14">
+      <mc:AlternateContent xmlns:mc="http://schemas.openxmlformats.org/markup-compatibility/2006" xmlns:a14="http://schemas.microsoft.com/office/drawing/2010/main">
+        <mc:Choice Requires="a14">
           <p:graphicFrame>
             <p:nvGraphicFramePr>
               <p:cNvPr id="18" name="Table 17">
@@ -9469,7 +9821,7 @@
             </a:graphic>
           </p:graphicFrame>
         </mc:Choice>
-        <mc:Fallback>
+        <mc:Fallback xmlns="">
           <p:graphicFrame>
             <p:nvGraphicFramePr>
               <p:cNvPr id="18" name="Table 17">
@@ -10062,6 +10414,95 @@
           <a:chExt cx="0" cy="0"/>
         </a:xfrm>
       </p:grpSpPr>
+      <p:pic>
+        <p:nvPicPr>
+          <p:cNvPr id="11" name="Picture 10">
+            <a:extLst>
+              <a:ext uri="{FF2B5EF4-FFF2-40B4-BE49-F238E27FC236}">
+                <a16:creationId xmlns:a16="http://schemas.microsoft.com/office/drawing/2014/main" id="{89C43887-1623-47C9-8C5E-F11FBA118B1B}"/>
+              </a:ext>
+            </a:extLst>
+          </p:cNvPr>
+          <p:cNvPicPr>
+            <a:picLocks noChangeAspect="1"/>
+          </p:cNvPicPr>
+          <p:nvPr/>
+        </p:nvPicPr>
+        <p:blipFill>
+          <a:blip r:embed="rId2"/>
+          <a:stretch>
+            <a:fillRect/>
+          </a:stretch>
+        </p:blipFill>
+        <p:spPr>
+          <a:xfrm>
+            <a:off x="6008980" y="1342340"/>
+            <a:ext cx="6366330" cy="4834623"/>
+          </a:xfrm>
+          <a:prstGeom prst="rect">
+            <a:avLst/>
+          </a:prstGeom>
+        </p:spPr>
+      </p:pic>
+      <p:sp>
+        <p:nvSpPr>
+          <p:cNvPr id="20" name="Rectangle 19">
+            <a:extLst>
+              <a:ext uri="{FF2B5EF4-FFF2-40B4-BE49-F238E27FC236}">
+                <a16:creationId xmlns:a16="http://schemas.microsoft.com/office/drawing/2014/main" id="{5C9732F2-CADF-4D45-A272-239D26D2CE71}"/>
+              </a:ext>
+            </a:extLst>
+          </p:cNvPr>
+          <p:cNvSpPr/>
+          <p:nvPr/>
+        </p:nvSpPr>
+        <p:spPr>
+          <a:xfrm>
+            <a:off x="10441143" y="2959260"/>
+            <a:ext cx="406496" cy="1989135"/>
+          </a:xfrm>
+          <a:prstGeom prst="rect">
+            <a:avLst/>
+          </a:prstGeom>
+          <a:solidFill>
+            <a:schemeClr val="accent6">
+              <a:lumMod val="20000"/>
+              <a:lumOff val="80000"/>
+            </a:schemeClr>
+          </a:solidFill>
+          <a:ln w="19050">
+            <a:solidFill>
+              <a:schemeClr val="accent6">
+                <a:lumMod val="50000"/>
+              </a:schemeClr>
+            </a:solidFill>
+          </a:ln>
+        </p:spPr>
+        <p:style>
+          <a:lnRef idx="2">
+            <a:schemeClr val="accent1">
+              <a:shade val="50000"/>
+            </a:schemeClr>
+          </a:lnRef>
+          <a:fillRef idx="1">
+            <a:schemeClr val="accent1"/>
+          </a:fillRef>
+          <a:effectRef idx="0">
+            <a:schemeClr val="accent1"/>
+          </a:effectRef>
+          <a:fontRef idx="minor">
+            <a:schemeClr val="lt1"/>
+          </a:fontRef>
+        </p:style>
+        <p:txBody>
+          <a:bodyPr rtlCol="0" anchor="ctr"/>
+          <a:lstStyle/>
+          <a:p>
+            <a:pPr algn="ctr"/>
+            <a:endParaRPr lang="en-US"/>
+          </a:p>
+        </p:txBody>
+      </p:sp>
       <p:sp>
         <p:nvSpPr>
           <p:cNvPr id="2" name="Title 1">
@@ -10085,7 +10526,7 @@
           <a:p>
             <a:r>
               <a:rPr lang="en-US" dirty="0"/>
-              <a:t>Methodology</a:t>
+              <a:t>Methodology and Assumptions</a:t>
             </a:r>
           </a:p>
         </p:txBody>
@@ -10119,7 +10560,7 @@
           <a:p>
             <a:r>
               <a:rPr lang="en-US" dirty="0"/>
-              <a:t>Altered </a:t>
+              <a:t>Extended </a:t>
             </a:r>
             <a:r>
               <a:rPr lang="en-US" dirty="0" err="1"/>
@@ -10140,6 +10581,12 @@
           <a:p>
             <a:r>
               <a:rPr lang="en-US" dirty="0"/>
+              <a:t>Extension threshold</a:t>
+            </a:r>
+          </a:p>
+          <a:p>
+            <a:r>
+              <a:rPr lang="en-US" dirty="0"/>
               <a:t>V2I communication</a:t>
             </a:r>
           </a:p>
@@ -10147,7 +10594,7 @@
             <a:pPr lvl="1"/>
             <a:r>
               <a:rPr lang="en-US" dirty="0"/>
-              <a:t>Perfect within 300m</a:t>
+              <a:t>N(300, 33^2) communication range</a:t>
             </a:r>
           </a:p>
           <a:p>
@@ -10194,7 +10641,7 @@
             <p:nvPr/>
           </p:nvPicPr>
           <p:blipFill>
-            <a:blip r:embed="rId2">
+            <a:blip r:embed="rId3">
               <a:extLst>
                 <a:ext uri="{28A0092B-C50C-407E-A947-70E740481C1C}">
                   <a14:useLocalDpi xmlns:a14="http://schemas.microsoft.com/office/drawing/2010/main" val="0"/>
@@ -10420,34 +10867,445 @@
           </a:p>
         </p:txBody>
       </p:sp>
+      <p:sp>
+        <p:nvSpPr>
+          <p:cNvPr id="12" name="Rectangle 11">
+            <a:extLst>
+              <a:ext uri="{FF2B5EF4-FFF2-40B4-BE49-F238E27FC236}">
+                <a16:creationId xmlns:a16="http://schemas.microsoft.com/office/drawing/2014/main" id="{4AC15017-F350-4E92-95DB-EEAD35DCB7D2}"/>
+              </a:ext>
+            </a:extLst>
+          </p:cNvPr>
+          <p:cNvSpPr/>
+          <p:nvPr/>
+        </p:nvSpPr>
+        <p:spPr>
+          <a:xfrm>
+            <a:off x="10414001" y="2830105"/>
+            <a:ext cx="450890" cy="78197"/>
+          </a:xfrm>
+          <a:prstGeom prst="rect">
+            <a:avLst/>
+          </a:prstGeom>
+          <a:solidFill>
+            <a:srgbClr val="00B050"/>
+          </a:solidFill>
+          <a:ln>
+            <a:solidFill>
+              <a:schemeClr val="bg1">
+                <a:lumMod val="65000"/>
+              </a:schemeClr>
+            </a:solidFill>
+          </a:ln>
+        </p:spPr>
+        <p:style>
+          <a:lnRef idx="2">
+            <a:schemeClr val="accent1">
+              <a:shade val="50000"/>
+            </a:schemeClr>
+          </a:lnRef>
+          <a:fillRef idx="1">
+            <a:schemeClr val="accent1"/>
+          </a:fillRef>
+          <a:effectRef idx="0">
+            <a:schemeClr val="accent1"/>
+          </a:effectRef>
+          <a:fontRef idx="minor">
+            <a:schemeClr val="lt1"/>
+          </a:fontRef>
+        </p:style>
+        <p:txBody>
+          <a:bodyPr rtlCol="0" anchor="ctr"/>
+          <a:lstStyle/>
+          <a:p>
+            <a:pPr algn="ctr"/>
+            <a:endParaRPr lang="en-US"/>
+          </a:p>
+        </p:txBody>
+      </p:sp>
+      <p:sp>
+        <p:nvSpPr>
+          <p:cNvPr id="13" name="Rectangle 12">
+            <a:extLst>
+              <a:ext uri="{FF2B5EF4-FFF2-40B4-BE49-F238E27FC236}">
+                <a16:creationId xmlns:a16="http://schemas.microsoft.com/office/drawing/2014/main" id="{AF0B3E5C-426C-4B45-ABCE-90AC2B71DC61}"/>
+              </a:ext>
+            </a:extLst>
+          </p:cNvPr>
+          <p:cNvSpPr/>
+          <p:nvPr/>
+        </p:nvSpPr>
+        <p:spPr>
+          <a:xfrm rot="5400000">
+            <a:off x="9956798" y="2381371"/>
+            <a:ext cx="450890" cy="78197"/>
+          </a:xfrm>
+          <a:prstGeom prst="rect">
+            <a:avLst/>
+          </a:prstGeom>
+          <a:solidFill>
+            <a:srgbClr val="FF0000"/>
+          </a:solidFill>
+          <a:ln>
+            <a:solidFill>
+              <a:schemeClr val="bg1">
+                <a:lumMod val="65000"/>
+              </a:schemeClr>
+            </a:solidFill>
+          </a:ln>
+        </p:spPr>
+        <p:style>
+          <a:lnRef idx="2">
+            <a:schemeClr val="accent1">
+              <a:shade val="50000"/>
+            </a:schemeClr>
+          </a:lnRef>
+          <a:fillRef idx="1">
+            <a:schemeClr val="accent1"/>
+          </a:fillRef>
+          <a:effectRef idx="0">
+            <a:schemeClr val="accent1"/>
+          </a:effectRef>
+          <a:fontRef idx="minor">
+            <a:schemeClr val="lt1"/>
+          </a:fontRef>
+        </p:style>
+        <p:txBody>
+          <a:bodyPr rtlCol="0" anchor="ctr"/>
+          <a:lstStyle/>
+          <a:p>
+            <a:pPr algn="ctr"/>
+            <a:endParaRPr lang="en-US"/>
+          </a:p>
+        </p:txBody>
+      </p:sp>
+      <p:sp>
+        <p:nvSpPr>
+          <p:cNvPr id="14" name="Arrow: Up 13">
+            <a:extLst>
+              <a:ext uri="{FF2B5EF4-FFF2-40B4-BE49-F238E27FC236}">
+                <a16:creationId xmlns:a16="http://schemas.microsoft.com/office/drawing/2014/main" id="{AB3A4513-642D-4507-B835-3619B3578B5E}"/>
+              </a:ext>
+            </a:extLst>
+          </p:cNvPr>
+          <p:cNvSpPr/>
+          <p:nvPr/>
+        </p:nvSpPr>
+        <p:spPr>
+          <a:xfrm>
+            <a:off x="11177296" y="4584700"/>
+            <a:ext cx="149246" cy="450850"/>
+          </a:xfrm>
+          <a:prstGeom prst="upArrow">
+            <a:avLst/>
+          </a:prstGeom>
+          <a:solidFill>
+            <a:schemeClr val="accent5">
+              <a:lumMod val="60000"/>
+              <a:lumOff val="40000"/>
+            </a:schemeClr>
+          </a:solidFill>
+          <a:ln>
+            <a:solidFill>
+              <a:schemeClr val="accent5">
+                <a:lumMod val="50000"/>
+              </a:schemeClr>
+            </a:solidFill>
+          </a:ln>
+        </p:spPr>
+        <p:style>
+          <a:lnRef idx="2">
+            <a:schemeClr val="accent1">
+              <a:shade val="50000"/>
+            </a:schemeClr>
+          </a:lnRef>
+          <a:fillRef idx="1">
+            <a:schemeClr val="accent1"/>
+          </a:fillRef>
+          <a:effectRef idx="0">
+            <a:schemeClr val="accent1"/>
+          </a:effectRef>
+          <a:fontRef idx="minor">
+            <a:schemeClr val="lt1"/>
+          </a:fontRef>
+        </p:style>
+        <p:txBody>
+          <a:bodyPr rtlCol="0" anchor="ctr"/>
+          <a:lstStyle/>
+          <a:p>
+            <a:pPr algn="ctr"/>
+            <a:endParaRPr lang="en-US"/>
+          </a:p>
+        </p:txBody>
+      </p:sp>
+      <p:sp>
+        <p:nvSpPr>
+          <p:cNvPr id="15" name="Arrow: Up 14">
+            <a:extLst>
+              <a:ext uri="{FF2B5EF4-FFF2-40B4-BE49-F238E27FC236}">
+                <a16:creationId xmlns:a16="http://schemas.microsoft.com/office/drawing/2014/main" id="{8726500D-0912-409E-92D2-074B92EF1231}"/>
+              </a:ext>
+            </a:extLst>
+          </p:cNvPr>
+          <p:cNvSpPr/>
+          <p:nvPr/>
+        </p:nvSpPr>
+        <p:spPr>
+          <a:xfrm rot="5400000">
+            <a:off x="7483131" y="1772356"/>
+            <a:ext cx="149246" cy="450850"/>
+          </a:xfrm>
+          <a:prstGeom prst="upArrow">
+            <a:avLst/>
+          </a:prstGeom>
+          <a:solidFill>
+            <a:schemeClr val="accent6">
+              <a:lumMod val="40000"/>
+              <a:lumOff val="60000"/>
+            </a:schemeClr>
+          </a:solidFill>
+          <a:ln>
+            <a:solidFill>
+              <a:schemeClr val="accent6">
+                <a:lumMod val="50000"/>
+              </a:schemeClr>
+            </a:solidFill>
+          </a:ln>
+        </p:spPr>
+        <p:style>
+          <a:lnRef idx="2">
+            <a:schemeClr val="accent1">
+              <a:shade val="50000"/>
+            </a:schemeClr>
+          </a:lnRef>
+          <a:fillRef idx="1">
+            <a:schemeClr val="accent1"/>
+          </a:fillRef>
+          <a:effectRef idx="0">
+            <a:schemeClr val="accent1"/>
+          </a:effectRef>
+          <a:fontRef idx="minor">
+            <a:schemeClr val="lt1"/>
+          </a:fontRef>
+        </p:style>
+        <p:txBody>
+          <a:bodyPr rtlCol="0" anchor="ctr"/>
+          <a:lstStyle/>
+          <a:p>
+            <a:pPr algn="ctr"/>
+            <a:endParaRPr lang="en-US"/>
+          </a:p>
+        </p:txBody>
+      </p:sp>
+      <p:sp>
+        <p:nvSpPr>
+          <p:cNvPr id="16" name="TextBox 15">
+            <a:extLst>
+              <a:ext uri="{FF2B5EF4-FFF2-40B4-BE49-F238E27FC236}">
+                <a16:creationId xmlns:a16="http://schemas.microsoft.com/office/drawing/2014/main" id="{0E010C24-D659-4ADA-A4AD-D063033A42D9}"/>
+              </a:ext>
+            </a:extLst>
+          </p:cNvPr>
+          <p:cNvSpPr txBox="1"/>
+          <p:nvPr/>
+        </p:nvSpPr>
+        <p:spPr>
+          <a:xfrm>
+            <a:off x="5907776" y="1828504"/>
+            <a:ext cx="1445524" cy="338554"/>
+          </a:xfrm>
+          <a:prstGeom prst="rect">
+            <a:avLst/>
+          </a:prstGeom>
+          <a:noFill/>
+        </p:spPr>
+        <p:txBody>
+          <a:bodyPr wrap="none" rtlCol="0">
+            <a:spAutoFit/>
+          </a:bodyPr>
+          <a:lstStyle/>
+          <a:p>
+            <a:r>
+              <a:rPr lang="en-US" sz="1600" dirty="0"/>
+              <a:t>One way traffic</a:t>
+            </a:r>
+          </a:p>
+        </p:txBody>
+      </p:sp>
+      <p:sp>
+        <p:nvSpPr>
+          <p:cNvPr id="17" name="TextBox 16">
+            <a:extLst>
+              <a:ext uri="{FF2B5EF4-FFF2-40B4-BE49-F238E27FC236}">
+                <a16:creationId xmlns:a16="http://schemas.microsoft.com/office/drawing/2014/main" id="{8F052C88-19E6-4F73-9AB0-BE0C3D70DD31}"/>
+              </a:ext>
+            </a:extLst>
+          </p:cNvPr>
+          <p:cNvSpPr txBox="1"/>
+          <p:nvPr/>
+        </p:nvSpPr>
+        <p:spPr>
+          <a:xfrm rot="16200000">
+            <a:off x="10529157" y="5589035"/>
+            <a:ext cx="1445524" cy="338554"/>
+          </a:xfrm>
+          <a:prstGeom prst="rect">
+            <a:avLst/>
+          </a:prstGeom>
+          <a:noFill/>
+        </p:spPr>
+        <p:txBody>
+          <a:bodyPr wrap="none" rtlCol="0">
+            <a:spAutoFit/>
+          </a:bodyPr>
+          <a:lstStyle/>
+          <a:p>
+            <a:r>
+              <a:rPr lang="en-US" sz="1600" dirty="0"/>
+              <a:t>One way traffic</a:t>
+            </a:r>
+          </a:p>
+        </p:txBody>
+      </p:sp>
       <p:pic>
         <p:nvPicPr>
-          <p:cNvPr id="11" name="Picture 10">
-            <a:extLst>
-              <a:ext uri="{FF2B5EF4-FFF2-40B4-BE49-F238E27FC236}">
-                <a16:creationId xmlns:a16="http://schemas.microsoft.com/office/drawing/2014/main" id="{89C43887-1623-47C9-8C5E-F11FBA118B1B}"/>
+          <p:cNvPr id="1026" name="Picture 2" descr="Image result for car from above">
+            <a:extLst>
+              <a:ext uri="{FF2B5EF4-FFF2-40B4-BE49-F238E27FC236}">
+                <a16:creationId xmlns:a16="http://schemas.microsoft.com/office/drawing/2014/main" id="{642415DA-5178-46EE-9FAA-4BF10246F740}"/>
               </a:ext>
             </a:extLst>
           </p:cNvPr>
           <p:cNvPicPr>
-            <a:picLocks noChangeAspect="1"/>
+            <a:picLocks noChangeAspect="1" noChangeArrowheads="1"/>
           </p:cNvPicPr>
           <p:nvPr/>
         </p:nvPicPr>
         <p:blipFill>
-          <a:blip r:embed="rId3"/>
+          <a:blip r:embed="rId4">
+            <a:extLst>
+              <a:ext uri="{28A0092B-C50C-407E-A947-70E740481C1C}">
+                <a14:useLocalDpi xmlns:a14="http://schemas.microsoft.com/office/drawing/2010/main" val="0"/>
+              </a:ext>
+            </a:extLst>
+          </a:blip>
+          <a:srcRect/>
           <a:stretch>
             <a:fillRect/>
           </a:stretch>
         </p:blipFill>
-        <p:spPr>
-          <a:xfrm>
-            <a:off x="6008980" y="1342340"/>
-            <a:ext cx="6366330" cy="4834623"/>
+        <p:spPr bwMode="auto">
+          <a:xfrm rot="16200000">
+            <a:off x="10273686" y="4263314"/>
+            <a:ext cx="731520" cy="362102"/>
           </a:xfrm>
           <a:prstGeom prst="rect">
             <a:avLst/>
           </a:prstGeom>
+          <a:noFill/>
+          <a:extLst>
+            <a:ext uri="{909E8E84-426E-40DD-AFC4-6F175D3DCCD1}">
+              <a14:hiddenFill xmlns:a14="http://schemas.microsoft.com/office/drawing/2010/main">
+                <a:solidFill>
+                  <a:srgbClr val="FFFFFF"/>
+                </a:solidFill>
+              </a14:hiddenFill>
+            </a:ext>
+          </a:extLst>
+        </p:spPr>
+      </p:pic>
+      <p:pic>
+        <p:nvPicPr>
+          <p:cNvPr id="1032" name="Picture 8" descr="Related image">
+            <a:extLst>
+              <a:ext uri="{FF2B5EF4-FFF2-40B4-BE49-F238E27FC236}">
+                <a16:creationId xmlns:a16="http://schemas.microsoft.com/office/drawing/2014/main" id="{2C317B39-A68F-4535-9F1E-19C28724DFA4}"/>
+              </a:ext>
+            </a:extLst>
+          </p:cNvPr>
+          <p:cNvPicPr>
+            <a:picLocks noChangeAspect="1" noChangeArrowheads="1"/>
+          </p:cNvPicPr>
+          <p:nvPr/>
+        </p:nvPicPr>
+        <p:blipFill>
+          <a:blip r:embed="rId5">
+            <a:extLst>
+              <a:ext uri="{28A0092B-C50C-407E-A947-70E740481C1C}">
+                <a14:useLocalDpi xmlns:a14="http://schemas.microsoft.com/office/drawing/2010/main" val="0"/>
+              </a:ext>
+            </a:extLst>
+          </a:blip>
+          <a:srcRect/>
+          <a:stretch>
+            <a:fillRect/>
+          </a:stretch>
+        </p:blipFill>
+        <p:spPr bwMode="auto">
+          <a:xfrm rot="16200000">
+            <a:off x="10279666" y="5312188"/>
+            <a:ext cx="731520" cy="362712"/>
+          </a:xfrm>
+          <a:prstGeom prst="rect">
+            <a:avLst/>
+          </a:prstGeom>
+          <a:noFill/>
+          <a:extLst>
+            <a:ext uri="{909E8E84-426E-40DD-AFC4-6F175D3DCCD1}">
+              <a14:hiddenFill xmlns:a14="http://schemas.microsoft.com/office/drawing/2010/main">
+                <a:solidFill>
+                  <a:srgbClr val="FFFFFF"/>
+                </a:solidFill>
+              </a14:hiddenFill>
+            </a:ext>
+          </a:extLst>
+        </p:spPr>
+      </p:pic>
+      <p:pic>
+        <p:nvPicPr>
+          <p:cNvPr id="1034" name="Picture 10" descr="Image result for car from above">
+            <a:extLst>
+              <a:ext uri="{FF2B5EF4-FFF2-40B4-BE49-F238E27FC236}">
+                <a16:creationId xmlns:a16="http://schemas.microsoft.com/office/drawing/2014/main" id="{3F75CB9C-9D42-4336-93AD-03F38708F2D0}"/>
+              </a:ext>
+            </a:extLst>
+          </p:cNvPr>
+          <p:cNvPicPr>
+            <a:picLocks noChangeAspect="1" noChangeArrowheads="1"/>
+          </p:cNvPicPr>
+          <p:nvPr/>
+        </p:nvPicPr>
+        <p:blipFill>
+          <a:blip r:embed="rId6">
+            <a:extLst>
+              <a:ext uri="{28A0092B-C50C-407E-A947-70E740481C1C}">
+                <a14:useLocalDpi xmlns:a14="http://schemas.microsoft.com/office/drawing/2010/main" val="0"/>
+              </a:ext>
+            </a:extLst>
+          </a:blip>
+          <a:srcRect/>
+          <a:stretch>
+            <a:fillRect/>
+          </a:stretch>
+        </p:blipFill>
+        <p:spPr bwMode="auto">
+          <a:xfrm>
+            <a:off x="9325249" y="2233420"/>
+            <a:ext cx="731520" cy="365760"/>
+          </a:xfrm>
+          <a:prstGeom prst="rect">
+            <a:avLst/>
+          </a:prstGeom>
+          <a:noFill/>
+          <a:extLst>
+            <a:ext uri="{909E8E84-426E-40DD-AFC4-6F175D3DCCD1}">
+              <a14:hiddenFill xmlns:a14="http://schemas.microsoft.com/office/drawing/2010/main">
+                <a:solidFill>
+                  <a:srgbClr val="FFFFFF"/>
+                </a:solidFill>
+              </a14:hiddenFill>
+            </a:ext>
+          </a:extLst>
         </p:spPr>
       </p:pic>
     </p:spTree>
@@ -10503,7 +11361,7 @@
           <a:p>
             <a:r>
               <a:rPr lang="en-US" dirty="0"/>
-              <a:t>Results</a:t>
+              <a:t>Experiment Parameters</a:t>
             </a:r>
           </a:p>
         </p:txBody>
@@ -10532,10 +11390,69 @@
         </p:spPr>
         <p:txBody>
           <a:bodyPr>
-            <a:normAutofit lnSpcReduction="10000"/>
+            <a:normAutofit/>
           </a:bodyPr>
           <a:lstStyle/>
           <a:p>
+            <a:r>
+              <a:rPr lang="en-US" dirty="0"/>
+              <a:t>Total intersection demand 800 </a:t>
+            </a:r>
+            <a:r>
+              <a:rPr lang="en-US" dirty="0" err="1"/>
+              <a:t>veh</a:t>
+            </a:r>
+            <a:r>
+              <a:rPr lang="en-US" dirty="0"/>
+              <a:t>/hour</a:t>
+            </a:r>
+          </a:p>
+          <a:p>
+            <a:r>
+              <a:rPr lang="en-US" dirty="0"/>
+              <a:t>Min green = 30 s, max green = 50 s</a:t>
+            </a:r>
+          </a:p>
+          <a:p>
+            <a:r>
+              <a:rPr lang="en-US" dirty="0"/>
+              <a:t>Advance detection only on primary corridor</a:t>
+            </a:r>
+          </a:p>
+          <a:p>
+            <a:r>
+              <a:rPr lang="en-US" dirty="0"/>
+              <a:t>Three configurations:</a:t>
+            </a:r>
+          </a:p>
+          <a:p>
+            <a:pPr lvl="1"/>
+            <a:r>
+              <a:rPr lang="en-US" dirty="0"/>
+              <a:t>Fixed-time</a:t>
+            </a:r>
+          </a:p>
+          <a:p>
+            <a:pPr lvl="1"/>
+            <a:r>
+              <a:rPr lang="en-US" dirty="0"/>
+              <a:t>Traditional advance detection</a:t>
+            </a:r>
+          </a:p>
+          <a:p>
+            <a:pPr lvl="1"/>
+            <a:r>
+              <a:rPr lang="en-US" dirty="0"/>
+              <a:t>V2I advance detection</a:t>
+            </a:r>
+          </a:p>
+          <a:p>
+            <a:r>
+              <a:rPr lang="en-US" dirty="0"/>
+              <a:t>Four cases, varying demand ratio</a:t>
+            </a:r>
+          </a:p>
+          <a:p>
             <a:endParaRPr lang="en-US" dirty="0"/>
           </a:p>
           <a:p>
@@ -10557,16 +11474,10 @@
             <a:endParaRPr lang="en-US" dirty="0"/>
           </a:p>
           <a:p>
-            <a:r>
-              <a:rPr lang="en-US" dirty="0"/>
-              <a:t>^Without V2I advance detection (base case)</a:t>
-            </a:r>
-          </a:p>
-          <a:p>
-            <a:r>
-              <a:rPr lang="en-US" dirty="0"/>
-              <a:t>(will have graphs comparing travel time on segment with and without v2i) </a:t>
-            </a:r>
+            <a:endParaRPr lang="en-US" dirty="0"/>
+          </a:p>
+          <a:p>
+            <a:endParaRPr lang="en-US" dirty="0"/>
           </a:p>
         </p:txBody>
       </p:sp>
@@ -10834,7 +11745,7 @@
     </p:spTree>
     <p:extLst>
       <p:ext uri="{BB962C8B-B14F-4D97-AF65-F5344CB8AC3E}">
-        <p14:creationId xmlns:p14="http://schemas.microsoft.com/office/powerpoint/2010/main" val="3747539"/>
+        <p14:creationId xmlns:p14="http://schemas.microsoft.com/office/powerpoint/2010/main" val="4234786067"/>
       </p:ext>
     </p:extLst>
   </p:cSld>
@@ -10884,7 +11795,7 @@
           <a:p>
             <a:r>
               <a:rPr lang="en-US" dirty="0"/>
-              <a:t>Conclusions</a:t>
+              <a:t>Results</a:t>
             </a:r>
           </a:p>
         </p:txBody>
@@ -10905,10 +11816,35 @@
             <p:ph idx="1"/>
           </p:nvPr>
         </p:nvSpPr>
-        <p:spPr/>
-        <p:txBody>
-          <a:bodyPr/>
+        <p:spPr>
+          <a:xfrm>
+            <a:off x="838200" y="1825624"/>
+            <a:ext cx="10515600" cy="4530727"/>
+          </a:xfrm>
+        </p:spPr>
+        <p:txBody>
+          <a:bodyPr>
+            <a:normAutofit/>
+          </a:bodyPr>
           <a:lstStyle/>
+          <a:p>
+            <a:endParaRPr lang="en-US" dirty="0"/>
+          </a:p>
+          <a:p>
+            <a:endParaRPr lang="en-US" dirty="0"/>
+          </a:p>
+          <a:p>
+            <a:endParaRPr lang="en-US" dirty="0"/>
+          </a:p>
+          <a:p>
+            <a:endParaRPr lang="en-US" dirty="0"/>
+          </a:p>
+          <a:p>
+            <a:endParaRPr lang="en-US" dirty="0"/>
+          </a:p>
+          <a:p>
+            <a:endParaRPr lang="en-US" dirty="0"/>
+          </a:p>
           <a:p>
             <a:endParaRPr lang="en-US" dirty="0"/>
           </a:p>
@@ -11178,7 +12114,7 @@
     </p:spTree>
     <p:extLst>
       <p:ext uri="{BB962C8B-B14F-4D97-AF65-F5344CB8AC3E}">
-        <p14:creationId xmlns:p14="http://schemas.microsoft.com/office/powerpoint/2010/main" val="2127349954"/>
+        <p14:creationId xmlns:p14="http://schemas.microsoft.com/office/powerpoint/2010/main" val="3747539"/>
       </p:ext>
     </p:extLst>
   </p:cSld>

</xml_diff>

<commit_message>
updating presentation and various results files
</commit_message>
<xml_diff>
--- a/CE391F_project_presentation_alexander_dunn.pptx
+++ b/CE391F_project_presentation_alexander_dunn.pptx
@@ -6139,7 +6139,7 @@
             <a:pPr lvl="1" fontAlgn="base"/>
             <a:r>
               <a:rPr lang="en-US" dirty="0"/>
-              <a:t>AIMSUN</a:t>
+              <a:t>AIMSUN uses Gipps’ Model</a:t>
             </a:r>
           </a:p>
           <a:p>
@@ -6574,8 +6574,8 @@
           </a:p>
         </p:txBody>
       </p:sp>
-      <mc:AlternateContent xmlns:mc="http://schemas.openxmlformats.org/markup-compatibility/2006" xmlns:a14="http://schemas.microsoft.com/office/drawing/2010/main">
-        <mc:Choice Requires="a14">
+      <mc:AlternateContent xmlns:mc="http://schemas.openxmlformats.org/markup-compatibility/2006">
+        <mc:Choice xmlns:a14="http://schemas.microsoft.com/office/drawing/2010/main" Requires="a14">
           <p:sp>
             <p:nvSpPr>
               <p:cNvPr id="3" name="Content Placeholder 2">
@@ -6607,14 +6607,14 @@
                 <a:pPr fontAlgn="base"/>
                 <a:r>
                   <a:rPr lang="en-US" dirty="0"/>
-                  <a:t>Specify following vehicle by speed</a:t>
+                  <a:t>Specifies following vehicle by speed</a:t>
                 </a:r>
               </a:p>
               <a:p>
                 <a:pPr fontAlgn="base"/>
                 <a:r>
                   <a:rPr lang="en-US" dirty="0"/>
-                  <a:t>Use timestep = reaction time (</a:t>
+                  <a:t>Uses timestep = reaction time (</a:t>
                 </a:r>
                 <a14:m>
                   <m:oMath xmlns:m="http://schemas.openxmlformats.org/officeDocument/2006/math">
@@ -6655,7 +6655,7 @@
             </p:txBody>
           </p:sp>
         </mc:Choice>
-        <mc:Fallback xmlns="">
+        <mc:Fallback>
           <p:sp>
             <p:nvSpPr>
               <p:cNvPr id="3" name="Content Placeholder 2">
@@ -10436,7 +10436,7 @@
         </p:blipFill>
         <p:spPr>
           <a:xfrm>
-            <a:off x="6008980" y="1342340"/>
+            <a:off x="6032032" y="1340190"/>
             <a:ext cx="6366330" cy="4834623"/>
           </a:xfrm>
           <a:prstGeom prst="rect">
@@ -10458,7 +10458,7 @@
         </p:nvSpPr>
         <p:spPr>
           <a:xfrm>
-            <a:off x="10441143" y="2959260"/>
+            <a:off x="10456511" y="2959260"/>
             <a:ext cx="406496" cy="1989135"/>
           </a:xfrm>
           <a:prstGeom prst="rect">
@@ -10531,81 +10531,197 @@
           </a:p>
         </p:txBody>
       </p:sp>
-      <p:sp>
-        <p:nvSpPr>
-          <p:cNvPr id="3" name="Content Placeholder 2">
-            <a:extLst>
-              <a:ext uri="{FF2B5EF4-FFF2-40B4-BE49-F238E27FC236}">
-                <a16:creationId xmlns:a16="http://schemas.microsoft.com/office/drawing/2014/main" id="{8A5E7AC2-F6BE-415A-9708-200667A18C06}"/>
-              </a:ext>
-            </a:extLst>
-          </p:cNvPr>
-          <p:cNvSpPr>
-            <a:spLocks noGrp="1"/>
-          </p:cNvSpPr>
-          <p:nvPr>
-            <p:ph idx="1"/>
-          </p:nvPr>
-        </p:nvSpPr>
-        <p:spPr/>
-        <p:txBody>
-          <a:bodyPr/>
-          <a:lstStyle/>
-          <a:p>
-            <a:r>
-              <a:rPr lang="en-US" dirty="0"/>
-              <a:t>Built simulation in Python</a:t>
-            </a:r>
-          </a:p>
-          <a:p>
-            <a:r>
-              <a:rPr lang="en-US" dirty="0"/>
-              <a:t>Extended </a:t>
-            </a:r>
-            <a:r>
-              <a:rPr lang="en-US" dirty="0" err="1"/>
-              <a:t>Gipp’s</a:t>
-            </a:r>
-            <a:r>
-              <a:rPr lang="en-US" dirty="0"/>
-              <a:t> Model </a:t>
-            </a:r>
-          </a:p>
-          <a:p>
-            <a:pPr lvl="1"/>
-            <a:r>
-              <a:rPr lang="en-US" dirty="0"/>
-              <a:t>Red light regime</a:t>
-            </a:r>
-          </a:p>
-          <a:p>
-            <a:r>
-              <a:rPr lang="en-US" dirty="0"/>
-              <a:t>Extension threshold</a:t>
-            </a:r>
-          </a:p>
-          <a:p>
-            <a:r>
-              <a:rPr lang="en-US" dirty="0"/>
-              <a:t>V2I communication</a:t>
-            </a:r>
-          </a:p>
-          <a:p>
-            <a:pPr lvl="1"/>
-            <a:r>
-              <a:rPr lang="en-US" dirty="0"/>
-              <a:t>N(300, 33^2) communication range</a:t>
-            </a:r>
-          </a:p>
-          <a:p>
-            <a:pPr lvl="1"/>
-            <a:r>
-              <a:rPr lang="en-US" dirty="0"/>
-              <a:t>Assume nearly perfect line of sight</a:t>
-            </a:r>
-          </a:p>
-        </p:txBody>
-      </p:sp>
+      <mc:AlternateContent xmlns:mc="http://schemas.openxmlformats.org/markup-compatibility/2006">
+        <mc:Choice xmlns:a14="http://schemas.microsoft.com/office/drawing/2010/main" Requires="a14">
+          <p:sp>
+            <p:nvSpPr>
+              <p:cNvPr id="3" name="Content Placeholder 2">
+                <a:extLst>
+                  <a:ext uri="{FF2B5EF4-FFF2-40B4-BE49-F238E27FC236}">
+                    <a16:creationId xmlns:a16="http://schemas.microsoft.com/office/drawing/2014/main" id="{8A5E7AC2-F6BE-415A-9708-200667A18C06}"/>
+                  </a:ext>
+                </a:extLst>
+              </p:cNvPr>
+              <p:cNvSpPr>
+                <a:spLocks noGrp="1"/>
+              </p:cNvSpPr>
+              <p:nvPr>
+                <p:ph idx="1"/>
+              </p:nvPr>
+            </p:nvSpPr>
+            <p:spPr>
+              <a:xfrm>
+                <a:off x="838200" y="1825625"/>
+                <a:ext cx="5661244" cy="4351338"/>
+              </a:xfrm>
+            </p:spPr>
+            <p:txBody>
+              <a:bodyPr/>
+              <a:lstStyle/>
+              <a:p>
+                <a:r>
+                  <a:rPr lang="en-US" dirty="0"/>
+                  <a:t>Extended </a:t>
+                </a:r>
+                <a:r>
+                  <a:rPr lang="en-US" dirty="0" err="1"/>
+                  <a:t>Gipp’s</a:t>
+                </a:r>
+                <a:r>
+                  <a:rPr lang="en-US" dirty="0"/>
+                  <a:t> Model </a:t>
+                </a:r>
+              </a:p>
+              <a:p>
+                <a:pPr lvl="1"/>
+                <a:r>
+                  <a:rPr lang="en-US" dirty="0"/>
+                  <a:t>Red light regime</a:t>
+                </a:r>
+              </a:p>
+              <a:p>
+                <a:r>
+                  <a:rPr lang="en-US" dirty="0"/>
+                  <a:t>Simulated isolated  signal</a:t>
+                </a:r>
+              </a:p>
+              <a:p>
+                <a:r>
+                  <a:rPr lang="en-US" dirty="0"/>
+                  <a:t>Extension threshold</a:t>
+                </a:r>
+              </a:p>
+              <a:p>
+                <a:r>
+                  <a:rPr lang="en-US" dirty="0"/>
+                  <a:t>V2I communication</a:t>
+                </a:r>
+              </a:p>
+              <a:p>
+                <a:pPr lvl="1"/>
+                <a14:m>
+                  <m:oMath xmlns:m="http://schemas.openxmlformats.org/officeDocument/2006/math">
+                    <m:r>
+                      <a:rPr lang="en-US" b="0" i="1" smtClean="0">
+                        <a:latin typeface="Cambria Math" panose="02040503050406030204" pitchFamily="18" charset="0"/>
+                      </a:rPr>
+                      <m:t>𝑁</m:t>
+                    </m:r>
+                    <m:d>
+                      <m:dPr>
+                        <m:ctrlPr>
+                          <a:rPr lang="en-US" b="0" i="1" smtClean="0">
+                            <a:latin typeface="Cambria Math" panose="02040503050406030204" pitchFamily="18" charset="0"/>
+                          </a:rPr>
+                        </m:ctrlPr>
+                      </m:dPr>
+                      <m:e>
+                        <m:r>
+                          <a:rPr lang="en-US" b="0" i="1" smtClean="0">
+                            <a:latin typeface="Cambria Math" panose="02040503050406030204" pitchFamily="18" charset="0"/>
+                          </a:rPr>
+                          <m:t>300, </m:t>
+                        </m:r>
+                        <m:sSup>
+                          <m:sSupPr>
+                            <m:ctrlPr>
+                              <a:rPr lang="en-US" b="0" i="1" smtClean="0">
+                                <a:latin typeface="Cambria Math" panose="02040503050406030204" pitchFamily="18" charset="0"/>
+                              </a:rPr>
+                            </m:ctrlPr>
+                          </m:sSupPr>
+                          <m:e>
+                            <m:r>
+                              <a:rPr lang="en-US" b="0" i="1" smtClean="0">
+                                <a:latin typeface="Cambria Math" panose="02040503050406030204" pitchFamily="18" charset="0"/>
+                              </a:rPr>
+                              <m:t>33</m:t>
+                            </m:r>
+                          </m:e>
+                          <m:sup>
+                            <m:r>
+                              <a:rPr lang="en-US" b="0" i="1" smtClean="0">
+                                <a:latin typeface="Cambria Math" panose="02040503050406030204" pitchFamily="18" charset="0"/>
+                              </a:rPr>
+                              <m:t>2</m:t>
+                            </m:r>
+                          </m:sup>
+                        </m:sSup>
+                      </m:e>
+                    </m:d>
+                    <m:r>
+                      <a:rPr lang="en-US" b="0" i="1" smtClean="0">
+                        <a:latin typeface="Cambria Math" panose="02040503050406030204" pitchFamily="18" charset="0"/>
+                      </a:rPr>
+                      <m:t> </m:t>
+                    </m:r>
+                    <m:r>
+                      <a:rPr lang="en-US" b="0" i="1" smtClean="0">
+                        <a:latin typeface="Cambria Math" panose="02040503050406030204" pitchFamily="18" charset="0"/>
+                      </a:rPr>
+                      <m:t>𝑚</m:t>
+                    </m:r>
+                  </m:oMath>
+                </a14:m>
+                <a:r>
+                  <a:rPr lang="en-US" dirty="0"/>
+                  <a:t> communication range</a:t>
+                </a:r>
+              </a:p>
+              <a:p>
+                <a:pPr lvl="1"/>
+                <a:r>
+                  <a:rPr lang="en-US" dirty="0"/>
+                  <a:t>Assume nearly perfect line of sight</a:t>
+                </a:r>
+              </a:p>
+            </p:txBody>
+          </p:sp>
+        </mc:Choice>
+        <mc:Fallback>
+          <p:sp>
+            <p:nvSpPr>
+              <p:cNvPr id="3" name="Content Placeholder 2">
+                <a:extLst>
+                  <a:ext uri="{FF2B5EF4-FFF2-40B4-BE49-F238E27FC236}">
+                    <a16:creationId xmlns:a16="http://schemas.microsoft.com/office/drawing/2014/main" id="{8A5E7AC2-F6BE-415A-9708-200667A18C06}"/>
+                  </a:ext>
+                </a:extLst>
+              </p:cNvPr>
+              <p:cNvSpPr>
+                <a:spLocks noGrp="1" noRot="1" noChangeAspect="1" noMove="1" noResize="1" noEditPoints="1" noAdjustHandles="1" noChangeArrowheads="1" noChangeShapeType="1" noTextEdit="1"/>
+              </p:cNvSpPr>
+              <p:nvPr>
+                <p:ph idx="1"/>
+              </p:nvPr>
+            </p:nvSpPr>
+            <p:spPr>
+              <a:xfrm>
+                <a:off x="838200" y="1825625"/>
+                <a:ext cx="5661244" cy="4351338"/>
+              </a:xfrm>
+              <a:blipFill>
+                <a:blip r:embed="rId3"/>
+                <a:stretch>
+                  <a:fillRect l="-1940" t="-2241"/>
+                </a:stretch>
+              </a:blipFill>
+            </p:spPr>
+            <p:txBody>
+              <a:bodyPr/>
+              <a:lstStyle/>
+              <a:p>
+                <a:r>
+                  <a:rPr lang="en-US">
+                    <a:noFill/>
+                  </a:rPr>
+                  <a:t> </a:t>
+                </a:r>
+              </a:p>
+            </p:txBody>
+          </p:sp>
+        </mc:Fallback>
+      </mc:AlternateContent>
       <p:grpSp>
         <p:nvGrpSpPr>
           <p:cNvPr id="7" name="Group 6">
@@ -10641,7 +10757,7 @@
             <p:nvPr/>
           </p:nvPicPr>
           <p:blipFill>
-            <a:blip r:embed="rId3">
+            <a:blip r:embed="rId4">
               <a:extLst>
                 <a:ext uri="{28A0092B-C50C-407E-A947-70E740481C1C}">
                   <a14:useLocalDpi xmlns:a14="http://schemas.microsoft.com/office/drawing/2010/main" val="0"/>
@@ -10993,7 +11109,7 @@
         </p:nvSpPr>
         <p:spPr>
           <a:xfrm>
-            <a:off x="11177296" y="4584700"/>
+            <a:off x="11077409" y="4154395"/>
             <a:ext cx="149246" cy="450850"/>
           </a:xfrm>
           <a:prstGeom prst="upArrow">
@@ -11052,21 +11168,21 @@
         </p:nvSpPr>
         <p:spPr>
           <a:xfrm rot="5400000">
-            <a:off x="7483131" y="1772356"/>
+            <a:off x="8074799" y="1772356"/>
             <a:ext cx="149246" cy="450850"/>
           </a:xfrm>
           <a:prstGeom prst="upArrow">
             <a:avLst/>
           </a:prstGeom>
           <a:solidFill>
-            <a:schemeClr val="accent6">
-              <a:lumMod val="40000"/>
-              <a:lumOff val="60000"/>
+            <a:schemeClr val="accent2">
+              <a:lumMod val="60000"/>
+              <a:lumOff val="40000"/>
             </a:schemeClr>
           </a:solidFill>
           <a:ln>
             <a:solidFill>
-              <a:schemeClr val="accent6">
+              <a:schemeClr val="accent2">
                 <a:lumMod val="50000"/>
               </a:schemeClr>
             </a:solidFill>
@@ -11111,7 +11227,7 @@
         </p:nvSpPr>
         <p:spPr>
           <a:xfrm>
-            <a:off x="5907776" y="1828504"/>
+            <a:off x="6499444" y="1828504"/>
             <a:ext cx="1445524" cy="338554"/>
           </a:xfrm>
           <a:prstGeom prst="rect">
@@ -11145,8 +11261,8 @@
           <p:nvPr/>
         </p:nvSpPr>
         <p:spPr>
-          <a:xfrm rot="16200000">
-            <a:off x="10529157" y="5589035"/>
+          <a:xfrm rot="5400000">
+            <a:off x="10444638" y="5158730"/>
             <a:ext cx="1445524" cy="338554"/>
           </a:xfrm>
           <a:prstGeom prst="rect">
@@ -11182,7 +11298,7 @@
           <p:nvPr/>
         </p:nvPicPr>
         <p:blipFill>
-          <a:blip r:embed="rId4">
+          <a:blip r:embed="rId5">
             <a:extLst>
               <a:ext uri="{28A0092B-C50C-407E-A947-70E740481C1C}">
                 <a14:useLocalDpi xmlns:a14="http://schemas.microsoft.com/office/drawing/2010/main" val="0"/>
@@ -11196,7 +11312,7 @@
         </p:blipFill>
         <p:spPr bwMode="auto">
           <a:xfrm rot="16200000">
-            <a:off x="10273686" y="4263314"/>
+            <a:off x="10289054" y="4263314"/>
             <a:ext cx="731520" cy="362102"/>
           </a:xfrm>
           <a:prstGeom prst="rect">
@@ -11229,7 +11345,7 @@
           <p:nvPr/>
         </p:nvPicPr>
         <p:blipFill>
-          <a:blip r:embed="rId5">
+          <a:blip r:embed="rId6">
             <a:extLst>
               <a:ext uri="{28A0092B-C50C-407E-A947-70E740481C1C}">
                 <a14:useLocalDpi xmlns:a14="http://schemas.microsoft.com/office/drawing/2010/main" val="0"/>
@@ -11243,7 +11359,7 @@
         </p:blipFill>
         <p:spPr bwMode="auto">
           <a:xfrm rot="16200000">
-            <a:off x="10279666" y="5312188"/>
+            <a:off x="10288749" y="5312188"/>
             <a:ext cx="731520" cy="362712"/>
           </a:xfrm>
           <a:prstGeom prst="rect">
@@ -11276,7 +11392,7 @@
           <p:nvPr/>
         </p:nvPicPr>
         <p:blipFill>
-          <a:blip r:embed="rId6">
+          <a:blip r:embed="rId7">
             <a:extLst>
               <a:ext uri="{28A0092B-C50C-407E-A947-70E740481C1C}">
                 <a14:useLocalDpi xmlns:a14="http://schemas.microsoft.com/office/drawing/2010/main" val="0"/>
@@ -11308,6 +11424,85 @@
           </a:extLst>
         </p:spPr>
       </p:pic>
+      <p:cxnSp>
+        <p:nvCxnSpPr>
+          <p:cNvPr id="19" name="Connector: Curved 18">
+            <a:extLst>
+              <a:ext uri="{FF2B5EF4-FFF2-40B4-BE49-F238E27FC236}">
+                <a16:creationId xmlns:a16="http://schemas.microsoft.com/office/drawing/2014/main" id="{521A8989-4337-40B0-ACC6-186F934BAFB9}"/>
+              </a:ext>
+            </a:extLst>
+          </p:cNvPr>
+          <p:cNvCxnSpPr>
+            <a:cxnSpLocks/>
+          </p:cNvCxnSpPr>
+          <p:nvPr/>
+        </p:nvCxnSpPr>
+        <p:spPr>
+          <a:xfrm flipV="1">
+            <a:off x="9774091" y="3344075"/>
+            <a:ext cx="865355" cy="441255"/>
+          </a:xfrm>
+          <a:prstGeom prst="curvedConnector3">
+            <a:avLst/>
+          </a:prstGeom>
+          <a:ln w="12700">
+            <a:solidFill>
+              <a:schemeClr val="tx1"/>
+            </a:solidFill>
+            <a:tailEnd type="triangle"/>
+          </a:ln>
+        </p:spPr>
+        <p:style>
+          <a:lnRef idx="1">
+            <a:schemeClr val="accent1"/>
+          </a:lnRef>
+          <a:fillRef idx="0">
+            <a:schemeClr val="accent1"/>
+          </a:fillRef>
+          <a:effectRef idx="0">
+            <a:schemeClr val="accent1"/>
+          </a:effectRef>
+          <a:fontRef idx="minor">
+            <a:schemeClr val="tx1"/>
+          </a:fontRef>
+        </p:style>
+      </p:cxnSp>
+      <p:sp>
+        <p:nvSpPr>
+          <p:cNvPr id="24" name="TextBox 23">
+            <a:extLst>
+              <a:ext uri="{FF2B5EF4-FFF2-40B4-BE49-F238E27FC236}">
+                <a16:creationId xmlns:a16="http://schemas.microsoft.com/office/drawing/2014/main" id="{0FCE706A-2ED7-44A5-B7F7-5767902F7589}"/>
+              </a:ext>
+            </a:extLst>
+          </p:cNvPr>
+          <p:cNvSpPr txBox="1"/>
+          <p:nvPr/>
+        </p:nvSpPr>
+        <p:spPr>
+          <a:xfrm>
+            <a:off x="7780142" y="3572836"/>
+            <a:ext cx="2047355" cy="369332"/>
+          </a:xfrm>
+          <a:prstGeom prst="rect">
+            <a:avLst/>
+          </a:prstGeom>
+          <a:noFill/>
+        </p:spPr>
+        <p:txBody>
+          <a:bodyPr wrap="none" rtlCol="0">
+            <a:spAutoFit/>
+          </a:bodyPr>
+          <a:lstStyle/>
+          <a:p>
+            <a:r>
+              <a:rPr lang="en-US" dirty="0"/>
+              <a:t>Extension threshold</a:t>
+            </a:r>
+          </a:p>
+        </p:txBody>
+      </p:sp>
     </p:spTree>
     <p:extLst>
       <p:ext uri="{BB962C8B-B14F-4D97-AF65-F5344CB8AC3E}">
@@ -11450,6 +11645,12 @@
             <a:r>
               <a:rPr lang="en-US" dirty="0"/>
               <a:t>Four cases, varying demand ratio</a:t>
+            </a:r>
+          </a:p>
+          <a:p>
+            <a:r>
+              <a:rPr lang="en-US" dirty="0"/>
+              <a:t>15 hours of data collection per case</a:t>
             </a:r>
           </a:p>
           <a:p>

</xml_diff>

<commit_message>
fixed that gray box in ppt
</commit_message>
<xml_diff>
--- a/CE391F_project_presentation_alexander_dunn.pptx
+++ b/CE391F_project_presentation_alexander_dunn.pptx
@@ -214,7 +214,7 @@
           <a:p>
             <a:fld id="{24FA3959-E200-4F92-9F0F-E1E2FBCFA4D1}" type="datetimeFigureOut">
               <a:rPr lang="en-US" smtClean="0"/>
-              <a:t>12/10/17</a:t>
+              <a:t>2017-12-10</a:t>
             </a:fld>
             <a:endParaRPr lang="en-US"/>
           </a:p>
@@ -628,7 +628,7 @@
           <a:p>
             <a:fld id="{09E31BD6-71F0-48CB-8F12-2BA491399544}" type="datetime1">
               <a:rPr lang="en-US" smtClean="0"/>
-              <a:t>12/10/17</a:t>
+              <a:t>2017-12-10</a:t>
             </a:fld>
             <a:endParaRPr lang="en-US"/>
           </a:p>
@@ -829,7 +829,7 @@
           <a:p>
             <a:fld id="{FE3990BE-4D26-46D4-AB3A-585E3314093C}" type="datetime1">
               <a:rPr lang="en-US" smtClean="0"/>
-              <a:t>12/10/17</a:t>
+              <a:t>2017-12-10</a:t>
             </a:fld>
             <a:endParaRPr lang="en-US"/>
           </a:p>
@@ -1040,7 +1040,7 @@
           <a:p>
             <a:fld id="{5B17F194-40A6-451F-B3E0-38F0DF096B51}" type="datetime1">
               <a:rPr lang="en-US" smtClean="0"/>
-              <a:t>12/10/17</a:t>
+              <a:t>2017-12-10</a:t>
             </a:fld>
             <a:endParaRPr lang="en-US"/>
           </a:p>
@@ -1241,7 +1241,7 @@
           <a:p>
             <a:fld id="{DE8E9C18-AC3A-46D0-9E36-53F6B20717C9}" type="datetime1">
               <a:rPr lang="en-US" smtClean="0"/>
-              <a:t>12/10/17</a:t>
+              <a:t>2017-12-10</a:t>
             </a:fld>
             <a:endParaRPr lang="en-US"/>
           </a:p>
@@ -1519,7 +1519,7 @@
           <a:p>
             <a:fld id="{F744186A-A145-43BF-A11E-AF48DE2EDF33}" type="datetime1">
               <a:rPr lang="en-US" smtClean="0"/>
-              <a:t>12/10/17</a:t>
+              <a:t>2017-12-10</a:t>
             </a:fld>
             <a:endParaRPr lang="en-US"/>
           </a:p>
@@ -1787,7 +1787,7 @@
           <a:p>
             <a:fld id="{0E6F083F-E7F6-4A03-84C5-35F31DB791FE}" type="datetime1">
               <a:rPr lang="en-US" smtClean="0"/>
-              <a:t>12/10/17</a:t>
+              <a:t>2017-12-10</a:t>
             </a:fld>
             <a:endParaRPr lang="en-US"/>
           </a:p>
@@ -2202,7 +2202,7 @@
           <a:p>
             <a:fld id="{0D577BDD-941A-403B-9A3D-51F413E612D2}" type="datetime1">
               <a:rPr lang="en-US" smtClean="0"/>
-              <a:t>12/10/17</a:t>
+              <a:t>2017-12-10</a:t>
             </a:fld>
             <a:endParaRPr lang="en-US"/>
           </a:p>
@@ -2346,7 +2346,7 @@
           <a:p>
             <a:fld id="{55F1DDD3-E38E-4709-B0D9-FCCE2E9705A6}" type="datetime1">
               <a:rPr lang="en-US" smtClean="0"/>
-              <a:t>12/10/17</a:t>
+              <a:t>2017-12-10</a:t>
             </a:fld>
             <a:endParaRPr lang="en-US"/>
           </a:p>
@@ -2462,7 +2462,7 @@
           <a:p>
             <a:fld id="{0956F791-754E-44D5-B411-67162EBD8EDC}" type="datetime1">
               <a:rPr lang="en-US" smtClean="0"/>
-              <a:t>12/10/17</a:t>
+              <a:t>2017-12-10</a:t>
             </a:fld>
             <a:endParaRPr lang="en-US"/>
           </a:p>
@@ -2776,7 +2776,7 @@
           <a:p>
             <a:fld id="{F1717065-FA0D-4EB9-B677-C0587B698345}" type="datetime1">
               <a:rPr lang="en-US" smtClean="0"/>
-              <a:t>12/10/17</a:t>
+              <a:t>2017-12-10</a:t>
             </a:fld>
             <a:endParaRPr lang="en-US"/>
           </a:p>
@@ -3067,7 +3067,7 @@
           <a:p>
             <a:fld id="{0CF8814B-722C-488D-9F14-A31035130475}" type="datetime1">
               <a:rPr lang="en-US" smtClean="0"/>
-              <a:t>12/10/17</a:t>
+              <a:t>2017-12-10</a:t>
             </a:fld>
             <a:endParaRPr lang="en-US"/>
           </a:p>
@@ -3311,7 +3311,7 @@
           <a:p>
             <a:fld id="{FD7E8687-828C-4E2F-B060-BA6F96F203DB}" type="datetime1">
               <a:rPr lang="en-US" smtClean="0"/>
-              <a:t>12/10/17</a:t>
+              <a:t>2017-12-10</a:t>
             </a:fld>
             <a:endParaRPr lang="en-US"/>
           </a:p>
@@ -4327,7 +4327,7 @@
           <a:p>
             <a:fld id="{ACB4D66B-B249-4FFD-A1BE-9D1F03DF6E29}" type="datetime1">
               <a:rPr lang="en-US" smtClean="0"/>
-              <a:t>12/10/17</a:t>
+              <a:t>2017-12-10</a:t>
             </a:fld>
             <a:endParaRPr lang="en-US"/>
           </a:p>
@@ -4886,7 +4886,7 @@
           <a:p>
             <a:fld id="{ACB4D66B-B249-4FFD-A1BE-9D1F03DF6E29}" type="datetime1">
               <a:rPr lang="en-US" smtClean="0"/>
-              <a:t>12/10/17</a:t>
+              <a:t>2017-12-10</a:t>
             </a:fld>
             <a:endParaRPr lang="en-US"/>
           </a:p>
@@ -5240,7 +5240,7 @@
           <a:p>
             <a:fld id="{ACB4D66B-B249-4FFD-A1BE-9D1F03DF6E29}" type="datetime1">
               <a:rPr lang="en-US" smtClean="0"/>
-              <a:t>12/10/17</a:t>
+              <a:t>2017-12-10</a:t>
             </a:fld>
             <a:endParaRPr lang="en-US"/>
           </a:p>
@@ -6351,7 +6351,7 @@
           <a:p>
             <a:fld id="{45055422-CF85-4F00-9AA1-6B0462132045}" type="datetime1">
               <a:rPr lang="en-US" smtClean="0"/>
-              <a:t>12/10/17</a:t>
+              <a:t>2017-12-10</a:t>
             </a:fld>
             <a:endParaRPr lang="en-US" dirty="0"/>
           </a:p>
@@ -6728,7 +6728,7 @@
           <a:p>
             <a:fld id="{ACB4D66B-B249-4FFD-A1BE-9D1F03DF6E29}" type="datetime1">
               <a:rPr lang="en-US" smtClean="0"/>
-              <a:t>12/10/17</a:t>
+              <a:t>2017-12-10</a:t>
             </a:fld>
             <a:endParaRPr lang="en-US"/>
           </a:p>
@@ -7198,7 +7198,7 @@
           <a:p>
             <a:fld id="{ACB4D66B-B249-4FFD-A1BE-9D1F03DF6E29}" type="datetime1">
               <a:rPr lang="en-US" smtClean="0"/>
-              <a:t>12/10/17</a:t>
+              <a:t>2017-12-10</a:t>
             </a:fld>
             <a:endParaRPr lang="en-US"/>
           </a:p>
@@ -7318,7 +7318,7 @@
         </p:nvSpPr>
         <p:spPr>
           <a:xfrm>
-            <a:off x="10412084" y="1825625"/>
+            <a:off x="10380280" y="1825625"/>
             <a:ext cx="1078302" cy="369332"/>
           </a:xfrm>
           <a:prstGeom prst="rect">
@@ -7661,7 +7661,7 @@
           <a:p>
             <a:fld id="{ACB4D66B-B249-4FFD-A1BE-9D1F03DF6E29}" type="datetime1">
               <a:rPr lang="en-US" smtClean="0"/>
-              <a:t>12/10/17</a:t>
+              <a:t>2017-12-10</a:t>
             </a:fld>
             <a:endParaRPr lang="en-US"/>
           </a:p>
@@ -8243,7 +8243,7 @@
           <a:p>
             <a:fld id="{ACB4D66B-B249-4FFD-A1BE-9D1F03DF6E29}" type="datetime1">
               <a:rPr lang="en-US" smtClean="0"/>
-              <a:t>12/10/17</a:t>
+              <a:t>2017-12-10</a:t>
             </a:fld>
             <a:endParaRPr lang="en-US"/>
           </a:p>
@@ -9784,7 +9784,7 @@
           <a:p>
             <a:fld id="{ACB4D66B-B249-4FFD-A1BE-9D1F03DF6E29}" type="datetime1">
               <a:rPr lang="en-US" smtClean="0"/>
-              <a:t>12/10/17</a:t>
+              <a:t>2017-12-10</a:t>
             </a:fld>
             <a:endParaRPr lang="en-US"/>
           </a:p>
@@ -12284,7 +12284,7 @@
           <a:p>
             <a:fld id="{ACB4D66B-B249-4FFD-A1BE-9D1F03DF6E29}" type="datetime1">
               <a:rPr lang="en-US" smtClean="0"/>
-              <a:t>12/10/17</a:t>
+              <a:t>2017-12-10</a:t>
             </a:fld>
             <a:endParaRPr lang="en-US"/>
           </a:p>
@@ -13772,7 +13772,7 @@
           <a:p>
             <a:fld id="{ACB4D66B-B249-4FFD-A1BE-9D1F03DF6E29}" type="datetime1">
               <a:rPr lang="en-US" smtClean="0"/>
-              <a:t>12/10/17</a:t>
+              <a:t>2017-12-10</a:t>
             </a:fld>
             <a:endParaRPr lang="en-US"/>
           </a:p>
@@ -14171,7 +14171,7 @@
           <a:p>
             <a:fld id="{ACB4D66B-B249-4FFD-A1BE-9D1F03DF6E29}" type="datetime1">
               <a:rPr lang="en-US" smtClean="0"/>
-              <a:t>12/10/17</a:t>
+              <a:t>2017-12-10</a:t>
             </a:fld>
             <a:endParaRPr lang="en-US"/>
           </a:p>

</xml_diff>

<commit_message>
changed results graphs in persentation
</commit_message>
<xml_diff>
--- a/CE391F_project_presentation_alexander_dunn.pptx
+++ b/CE391F_project_presentation_alexander_dunn.pptx
@@ -17,7 +17,7 @@
     <p:sldId id="271" r:id="rId8"/>
     <p:sldId id="275" r:id="rId9"/>
     <p:sldId id="276" r:id="rId10"/>
-    <p:sldId id="272" r:id="rId11"/>
+    <p:sldId id="278" r:id="rId11"/>
     <p:sldId id="277" r:id="rId12"/>
     <p:sldId id="273" r:id="rId13"/>
     <p:sldId id="264" r:id="rId14"/>
@@ -4021,36 +4021,6 @@
           <a:chExt cx="0" cy="0"/>
         </a:xfrm>
       </p:grpSpPr>
-      <p:pic>
-        <p:nvPicPr>
-          <p:cNvPr id="16" name="Picture 15">
-            <a:extLst>
-              <a:ext uri="{FF2B5EF4-FFF2-40B4-BE49-F238E27FC236}">
-                <a16:creationId xmlns:a16="http://schemas.microsoft.com/office/drawing/2014/main" id="{9EC57137-BF84-49BE-9301-9928FEB4B4C0}"/>
-              </a:ext>
-            </a:extLst>
-          </p:cNvPr>
-          <p:cNvPicPr>
-            <a:picLocks noChangeAspect="1"/>
-          </p:cNvPicPr>
-          <p:nvPr/>
-        </p:nvPicPr>
-        <p:blipFill>
-          <a:blip r:embed="rId2"/>
-          <a:stretch>
-            <a:fillRect/>
-          </a:stretch>
-        </p:blipFill>
-        <p:spPr>
-          <a:xfrm>
-            <a:off x="5750152" y="1764389"/>
-            <a:ext cx="6455368" cy="3931920"/>
-          </a:xfrm>
-          <a:prstGeom prst="rect">
-            <a:avLst/>
-          </a:prstGeom>
-        </p:spPr>
-      </p:pic>
       <p:sp>
         <p:nvSpPr>
           <p:cNvPr id="2" name="Title 1">
@@ -4164,7 +4134,7 @@
             <p:nvPr/>
           </p:nvPicPr>
           <p:blipFill>
-            <a:blip r:embed="rId3">
+            <a:blip r:embed="rId2">
               <a:extLst>
                 <a:ext uri="{28A0092B-C50C-407E-A947-70E740481C1C}">
                   <a14:useLocalDpi xmlns:a14="http://schemas.microsoft.com/office/drawing/2010/main" val="0"/>
@@ -4390,12 +4360,112 @@
           </a:p>
         </p:txBody>
       </p:sp>
+      <p:sp>
+        <p:nvSpPr>
+          <p:cNvPr id="18" name="TextBox 17">
+            <a:extLst>
+              <a:ext uri="{FF2B5EF4-FFF2-40B4-BE49-F238E27FC236}">
+                <a16:creationId xmlns:a16="http://schemas.microsoft.com/office/drawing/2014/main" id="{9B06CC5F-66FE-4D03-B89B-7C8A32D00C7C}"/>
+              </a:ext>
+            </a:extLst>
+          </p:cNvPr>
+          <p:cNvSpPr txBox="1"/>
+          <p:nvPr/>
+        </p:nvSpPr>
+        <p:spPr>
+          <a:xfrm>
+            <a:off x="7284012" y="1629769"/>
+            <a:ext cx="4524444" cy="400110"/>
+          </a:xfrm>
+          <a:prstGeom prst="rect">
+            <a:avLst/>
+          </a:prstGeom>
+          <a:noFill/>
+        </p:spPr>
+        <p:txBody>
+          <a:bodyPr wrap="none" rtlCol="0">
+            <a:spAutoFit/>
+          </a:bodyPr>
+          <a:lstStyle/>
+          <a:p>
+            <a:r>
+              <a:rPr lang="en-US" sz="2000" dirty="0"/>
+              <a:t>Percent Change in Side-Street Travel Time</a:t>
+            </a:r>
+          </a:p>
+        </p:txBody>
+      </p:sp>
+      <p:sp>
+        <p:nvSpPr>
+          <p:cNvPr id="22" name="TextBox 21">
+            <a:extLst>
+              <a:ext uri="{FF2B5EF4-FFF2-40B4-BE49-F238E27FC236}">
+                <a16:creationId xmlns:a16="http://schemas.microsoft.com/office/drawing/2014/main" id="{8885E8E5-8FAA-47BC-932D-C5821BD0119A}"/>
+              </a:ext>
+            </a:extLst>
+          </p:cNvPr>
+          <p:cNvSpPr txBox="1"/>
+          <p:nvPr/>
+        </p:nvSpPr>
+        <p:spPr>
+          <a:xfrm>
+            <a:off x="805445" y="1629769"/>
+            <a:ext cx="4416978" cy="400110"/>
+          </a:xfrm>
+          <a:prstGeom prst="rect">
+            <a:avLst/>
+          </a:prstGeom>
+          <a:noFill/>
+        </p:spPr>
+        <p:txBody>
+          <a:bodyPr wrap="none" rtlCol="0">
+            <a:spAutoFit/>
+          </a:bodyPr>
+          <a:lstStyle/>
+          <a:p>
+            <a:r>
+              <a:rPr lang="en-US" sz="2000" dirty="0"/>
+              <a:t>Percent Change in Main-Line Travel Time</a:t>
+            </a:r>
+          </a:p>
+        </p:txBody>
+      </p:sp>
       <p:pic>
         <p:nvPicPr>
-          <p:cNvPr id="13" name="Picture 12">
-            <a:extLst>
-              <a:ext uri="{FF2B5EF4-FFF2-40B4-BE49-F238E27FC236}">
-                <a16:creationId xmlns:a16="http://schemas.microsoft.com/office/drawing/2014/main" id="{1FF0AF1C-D68A-43DB-9AFB-5883D21842A7}"/>
+          <p:cNvPr id="14" name="Picture 13">
+            <a:extLst>
+              <a:ext uri="{FF2B5EF4-FFF2-40B4-BE49-F238E27FC236}">
+                <a16:creationId xmlns:a16="http://schemas.microsoft.com/office/drawing/2014/main" id="{FFF2B956-033E-43E3-9A36-599C5137E82B}"/>
+              </a:ext>
+            </a:extLst>
+          </p:cNvPr>
+          <p:cNvPicPr>
+            <a:picLocks noChangeAspect="1"/>
+          </p:cNvPicPr>
+          <p:nvPr/>
+        </p:nvPicPr>
+        <p:blipFill>
+          <a:blip r:embed="rId3"/>
+          <a:stretch>
+            <a:fillRect/>
+          </a:stretch>
+        </p:blipFill>
+        <p:spPr>
+          <a:xfrm>
+            <a:off x="12602" y="2050608"/>
+            <a:ext cx="6002665" cy="3657600"/>
+          </a:xfrm>
+          <a:prstGeom prst="rect">
+            <a:avLst/>
+          </a:prstGeom>
+        </p:spPr>
+      </p:pic>
+      <p:pic>
+        <p:nvPicPr>
+          <p:cNvPr id="17" name="Picture 16">
+            <a:extLst>
+              <a:ext uri="{FF2B5EF4-FFF2-40B4-BE49-F238E27FC236}">
+                <a16:creationId xmlns:a16="http://schemas.microsoft.com/office/drawing/2014/main" id="{9325A653-CF2F-4634-AC07-E9BBC2A3A142}"/>
               </a:ext>
             </a:extLst>
           </p:cNvPr>
@@ -4412,148 +4482,18 @@
         </p:blipFill>
         <p:spPr>
           <a:xfrm>
-            <a:off x="550698" y="2279106"/>
-            <a:ext cx="3806139" cy="2315156"/>
+            <a:off x="6166786" y="2050607"/>
+            <a:ext cx="6002665" cy="3657600"/>
           </a:xfrm>
           <a:prstGeom prst="rect">
             <a:avLst/>
           </a:prstGeom>
         </p:spPr>
       </p:pic>
-      <p:pic>
-        <p:nvPicPr>
-          <p:cNvPr id="15" name="Picture 14">
-            <a:extLst>
-              <a:ext uri="{FF2B5EF4-FFF2-40B4-BE49-F238E27FC236}">
-                <a16:creationId xmlns:a16="http://schemas.microsoft.com/office/drawing/2014/main" id="{1D52EB66-AA70-4F3F-8BA0-B2A03E5E41D3}"/>
-              </a:ext>
-            </a:extLst>
-          </p:cNvPr>
-          <p:cNvPicPr>
-            <a:picLocks noChangeAspect="1"/>
-          </p:cNvPicPr>
-          <p:nvPr/>
-        </p:nvPicPr>
-        <p:blipFill>
-          <a:blip r:embed="rId4"/>
-          <a:stretch>
-            <a:fillRect/>
-          </a:stretch>
-        </p:blipFill>
-        <p:spPr>
-          <a:xfrm>
-            <a:off x="18534" y="1764389"/>
-            <a:ext cx="6013130" cy="3657600"/>
-          </a:xfrm>
-          <a:prstGeom prst="rect">
-            <a:avLst/>
-          </a:prstGeom>
-        </p:spPr>
-      </p:pic>
-      <p:sp>
-        <p:nvSpPr>
-          <p:cNvPr id="18" name="TextBox 17">
-            <a:extLst>
-              <a:ext uri="{FF2B5EF4-FFF2-40B4-BE49-F238E27FC236}">
-                <a16:creationId xmlns:a16="http://schemas.microsoft.com/office/drawing/2014/main" id="{9B06CC5F-66FE-4D03-B89B-7C8A32D00C7C}"/>
-              </a:ext>
-            </a:extLst>
-          </p:cNvPr>
-          <p:cNvSpPr txBox="1"/>
-          <p:nvPr/>
-        </p:nvSpPr>
-        <p:spPr>
-          <a:xfrm>
-            <a:off x="7472948" y="1539702"/>
-            <a:ext cx="3768211" cy="400110"/>
-          </a:xfrm>
-          <a:prstGeom prst="rect">
-            <a:avLst/>
-          </a:prstGeom>
-          <a:noFill/>
-        </p:spPr>
-        <p:txBody>
-          <a:bodyPr wrap="none" rtlCol="0">
-            <a:spAutoFit/>
-          </a:bodyPr>
-          <a:lstStyle/>
-          <a:p>
-            <a:r>
-              <a:rPr lang="en-US" sz="2000" dirty="0"/>
-              <a:t>Increase in Side-Street Travel Time</a:t>
-            </a:r>
-          </a:p>
-        </p:txBody>
-      </p:sp>
-      <p:pic>
-        <p:nvPicPr>
-          <p:cNvPr id="21" name="Picture 20">
-            <a:extLst>
-              <a:ext uri="{FF2B5EF4-FFF2-40B4-BE49-F238E27FC236}">
-                <a16:creationId xmlns:a16="http://schemas.microsoft.com/office/drawing/2014/main" id="{0E0FAE3D-01B5-4538-9952-17C234AB2BB2}"/>
-              </a:ext>
-            </a:extLst>
-          </p:cNvPr>
-          <p:cNvPicPr>
-            <a:picLocks noChangeAspect="1"/>
-          </p:cNvPicPr>
-          <p:nvPr/>
-        </p:nvPicPr>
-        <p:blipFill>
-          <a:blip r:embed="rId4"/>
-          <a:stretch>
-            <a:fillRect/>
-          </a:stretch>
-        </p:blipFill>
-        <p:spPr>
-          <a:xfrm>
-            <a:off x="-67733" y="1751925"/>
-            <a:ext cx="6464115" cy="3931920"/>
-          </a:xfrm>
-          <a:prstGeom prst="rect">
-            <a:avLst/>
-          </a:prstGeom>
-        </p:spPr>
-      </p:pic>
-      <p:sp>
-        <p:nvSpPr>
-          <p:cNvPr id="22" name="TextBox 21">
-            <a:extLst>
-              <a:ext uri="{FF2B5EF4-FFF2-40B4-BE49-F238E27FC236}">
-                <a16:creationId xmlns:a16="http://schemas.microsoft.com/office/drawing/2014/main" id="{8885E8E5-8FAA-47BC-932D-C5821BD0119A}"/>
-              </a:ext>
-            </a:extLst>
-          </p:cNvPr>
-          <p:cNvSpPr txBox="1"/>
-          <p:nvPr/>
-        </p:nvSpPr>
-        <p:spPr>
-          <a:xfrm>
-            <a:off x="1329410" y="1527238"/>
-            <a:ext cx="3747308" cy="400110"/>
-          </a:xfrm>
-          <a:prstGeom prst="rect">
-            <a:avLst/>
-          </a:prstGeom>
-          <a:noFill/>
-        </p:spPr>
-        <p:txBody>
-          <a:bodyPr wrap="none" rtlCol="0">
-            <a:spAutoFit/>
-          </a:bodyPr>
-          <a:lstStyle/>
-          <a:p>
-            <a:r>
-              <a:rPr lang="en-US" sz="2000" dirty="0"/>
-              <a:t>Decrease in Main-Line Travel Time</a:t>
-            </a:r>
-          </a:p>
-        </p:txBody>
-      </p:sp>
     </p:spTree>
     <p:extLst>
       <p:ext uri="{BB962C8B-B14F-4D97-AF65-F5344CB8AC3E}">
-        <p14:creationId xmlns:p14="http://schemas.microsoft.com/office/powerpoint/2010/main" val="3747539"/>
+        <p14:creationId xmlns:p14="http://schemas.microsoft.com/office/powerpoint/2010/main" val="1096880883"/>
       </p:ext>
     </p:extLst>
   </p:cSld>
@@ -4580,36 +4520,6 @@
           <a:chExt cx="0" cy="0"/>
         </a:xfrm>
       </p:grpSpPr>
-      <p:pic>
-        <p:nvPicPr>
-          <p:cNvPr id="12" name="Picture 11">
-            <a:extLst>
-              <a:ext uri="{FF2B5EF4-FFF2-40B4-BE49-F238E27FC236}">
-                <a16:creationId xmlns:a16="http://schemas.microsoft.com/office/drawing/2014/main" id="{49660C56-DDA4-4BD2-AEC8-CD875F38E6E2}"/>
-              </a:ext>
-            </a:extLst>
-          </p:cNvPr>
-          <p:cNvPicPr>
-            <a:picLocks noChangeAspect="1"/>
-          </p:cNvPicPr>
-          <p:nvPr/>
-        </p:nvPicPr>
-        <p:blipFill>
-          <a:blip r:embed="rId2"/>
-          <a:stretch>
-            <a:fillRect/>
-          </a:stretch>
-        </p:blipFill>
-        <p:spPr>
-          <a:xfrm>
-            <a:off x="2113141" y="1429358"/>
-            <a:ext cx="8241855" cy="5020056"/>
-          </a:xfrm>
-          <a:prstGeom prst="rect">
-            <a:avLst/>
-          </a:prstGeom>
-        </p:spPr>
-      </p:pic>
       <p:sp>
         <p:nvSpPr>
           <p:cNvPr id="2" name="Title 1">
@@ -4723,7 +4633,7 @@
             <p:nvPr/>
           </p:nvPicPr>
           <p:blipFill>
-            <a:blip r:embed="rId3">
+            <a:blip r:embed="rId2">
               <a:extLst>
                 <a:ext uri="{28A0092B-C50C-407E-A947-70E740481C1C}">
                   <a14:useLocalDpi xmlns:a14="http://schemas.microsoft.com/office/drawing/2010/main" val="0"/>
@@ -4984,6 +4894,36 @@
           </a:p>
         </p:txBody>
       </p:sp>
+      <p:pic>
+        <p:nvPicPr>
+          <p:cNvPr id="11" name="Picture 10">
+            <a:extLst>
+              <a:ext uri="{FF2B5EF4-FFF2-40B4-BE49-F238E27FC236}">
+                <a16:creationId xmlns:a16="http://schemas.microsoft.com/office/drawing/2014/main" id="{0BEDE363-4D26-48B8-B96E-C74C673F087F}"/>
+              </a:ext>
+            </a:extLst>
+          </p:cNvPr>
+          <p:cNvPicPr>
+            <a:picLocks noChangeAspect="1"/>
+          </p:cNvPicPr>
+          <p:nvPr/>
+        </p:nvPicPr>
+        <p:blipFill>
+          <a:blip r:embed="rId3"/>
+          <a:stretch>
+            <a:fillRect/>
+          </a:stretch>
+        </p:blipFill>
+        <p:spPr>
+          <a:xfrm>
+            <a:off x="2587205" y="1633008"/>
+            <a:ext cx="7898402" cy="4821578"/>
+          </a:xfrm>
+          <a:prstGeom prst="rect">
+            <a:avLst/>
+          </a:prstGeom>
+        </p:spPr>
+      </p:pic>
     </p:spTree>
     <p:extLst>
       <p:ext uri="{BB962C8B-B14F-4D97-AF65-F5344CB8AC3E}">
@@ -11909,8 +11849,8 @@
           </a:p>
         </p:txBody>
       </p:sp>
-      <mc:AlternateContent xmlns:mc="http://schemas.openxmlformats.org/markup-compatibility/2006">
-        <mc:Choice xmlns:a14="http://schemas.microsoft.com/office/drawing/2010/main" Requires="a14">
+      <mc:AlternateContent xmlns:mc="http://schemas.openxmlformats.org/markup-compatibility/2006" xmlns:a14="http://schemas.microsoft.com/office/drawing/2010/main">
+        <mc:Choice Requires="a14">
           <p:sp>
             <p:nvSpPr>
               <p:cNvPr id="3" name="Content Placeholder 2">
@@ -12056,7 +11996,7 @@
             </p:txBody>
           </p:sp>
         </mc:Choice>
-        <mc:Fallback>
+        <mc:Fallback xmlns="">
           <p:sp>
             <p:nvSpPr>
               <p:cNvPr id="3" name="Content Placeholder 2">

</xml_diff>